<commit_message>
Add slides to presentation
</commit_message>
<xml_diff>
--- a/SharedPipelinePresentation.pptx
+++ b/SharedPipelinePresentation.pptx
@@ -5,7 +5,7 @@
     <p:sldMasterId id="2147483648" r:id="rId1"/>
   </p:sldMasterIdLst>
   <p:notesMasterIdLst>
-    <p:notesMasterId r:id="rId9"/>
+    <p:notesMasterId r:id="rId17"/>
   </p:notesMasterIdLst>
   <p:sldIdLst>
     <p:sldId id="256" r:id="rId2"/>
@@ -14,7 +14,15 @@
     <p:sldId id="262" r:id="rId5"/>
     <p:sldId id="259" r:id="rId6"/>
     <p:sldId id="257" r:id="rId7"/>
-    <p:sldId id="260" r:id="rId8"/>
+    <p:sldId id="265" r:id="rId8"/>
+    <p:sldId id="264" r:id="rId9"/>
+    <p:sldId id="268" r:id="rId10"/>
+    <p:sldId id="267" r:id="rId11"/>
+    <p:sldId id="269" r:id="rId12"/>
+    <p:sldId id="266" r:id="rId13"/>
+    <p:sldId id="270" r:id="rId14"/>
+    <p:sldId id="263" r:id="rId15"/>
+    <p:sldId id="260" r:id="rId16"/>
   </p:sldIdLst>
   <p:sldSz cx="9144000" cy="6858000" type="screen4x3"/>
   <p:notesSz cx="6858000" cy="9144000"/>
@@ -556,15 +564,7 @@
             </a:r>
             <a:r>
               <a:rPr lang="en-US" baseline="0" dirty="0" smtClean="0"/>
-              <a:t> awesome </a:t>
-            </a:r>
-            <a:r>
-              <a:rPr lang="en-US" baseline="0" dirty="0" err="1" smtClean="0"/>
-              <a:t>presnsetaiton</a:t>
-            </a:r>
-            <a:r>
-              <a:rPr lang="en-US" baseline="0" dirty="0" smtClean="0"/>
-              <a:t>.</a:t>
+              <a:t> awesome presentation.</a:t>
             </a:r>
           </a:p>
           <a:p>
@@ -699,15 +699,7 @@
             </a:r>
             <a:r>
               <a:rPr lang="en-US" baseline="0" dirty="0" smtClean="0"/>
-              <a:t> in the JENKINS_HOME or use a plugin called </a:t>
-            </a:r>
-            <a:r>
-              <a:rPr lang="en-US" baseline="0" dirty="0" err="1" smtClean="0"/>
-              <a:t>Configuraiton</a:t>
-            </a:r>
-            <a:r>
-              <a:rPr lang="en-US" baseline="0" dirty="0" smtClean="0"/>
-              <a:t> Slicing (https://</a:t>
+              <a:t> in the JENKINS_HOME or use a plugin called Configuration Slicing (https://</a:t>
             </a:r>
             <a:r>
               <a:rPr lang="en-US" baseline="0" dirty="0" err="1" smtClean="0"/>
@@ -730,6 +722,15 @@
             <a:r>
               <a:rPr lang="en-US" baseline="0" dirty="0" smtClean="0"/>
               <a:t>Somehow painful, no?</a:t>
+            </a:r>
+          </a:p>
+          <a:p>
+            <a:endParaRPr lang="en-US" baseline="0" dirty="0" smtClean="0"/>
+          </a:p>
+          <a:p>
+            <a:r>
+              <a:rPr lang="en-US" baseline="0" dirty="0" smtClean="0"/>
+              <a:t>We went a long run using Managed Scripts. (The good part of that is that they can be written in groovy but also in python and bash and we a big number of python programmers)</a:t>
             </a:r>
           </a:p>
           <a:p>
@@ -774,6 +775,748 @@
     <p:extLst>
       <p:ext uri="{BB962C8B-B14F-4D97-AF65-F5344CB8AC3E}">
         <p14:creationId xmlns:p14="http://schemas.microsoft.com/office/powerpoint/2010/main" val="3583779059"/>
+      </p:ext>
+    </p:extLst>
+  </p:cSld>
+  <p:clrMapOvr>
+    <a:masterClrMapping/>
+  </p:clrMapOvr>
+</p:notes>
+</file>
+
+<file path=ppt/notesSlides/notesSlide10.xml><?xml version="1.0" encoding="utf-8"?>
+<p:notes xmlns:a="http://schemas.openxmlformats.org/drawingml/2006/main" xmlns:r="http://schemas.openxmlformats.org/officeDocument/2006/relationships" xmlns:p="http://schemas.openxmlformats.org/presentationml/2006/main">
+  <p:cSld>
+    <p:spTree>
+      <p:nvGrpSpPr>
+        <p:cNvPr id="1" name=""/>
+        <p:cNvGrpSpPr/>
+        <p:nvPr/>
+      </p:nvGrpSpPr>
+      <p:grpSpPr>
+        <a:xfrm>
+          <a:off x="0" y="0"/>
+          <a:ext cx="0" cy="0"/>
+          <a:chOff x="0" y="0"/>
+          <a:chExt cx="0" cy="0"/>
+        </a:xfrm>
+      </p:grpSpPr>
+      <p:sp>
+        <p:nvSpPr>
+          <p:cNvPr id="2" name="Slide Image Placeholder 1"/>
+          <p:cNvSpPr>
+            <a:spLocks noGrp="1" noRot="1" noChangeAspect="1"/>
+          </p:cNvSpPr>
+          <p:nvPr>
+            <p:ph type="sldImg"/>
+          </p:nvPr>
+        </p:nvSpPr>
+        <p:spPr/>
+      </p:sp>
+      <p:sp>
+        <p:nvSpPr>
+          <p:cNvPr id="3" name="Notes Placeholder 2"/>
+          <p:cNvSpPr>
+            <a:spLocks noGrp="1"/>
+          </p:cNvSpPr>
+          <p:nvPr>
+            <p:ph type="body" idx="1"/>
+          </p:nvPr>
+        </p:nvSpPr>
+        <p:spPr/>
+        <p:txBody>
+          <a:bodyPr/>
+          <a:lstStyle/>
+          <a:p>
+            <a:pPr marL="0" marR="0" indent="0" algn="l" defTabSz="457200" rtl="0" eaLnBrk="1" fontAlgn="auto" latinLnBrk="0" hangingPunct="1">
+              <a:lnSpc>
+                <a:spcPct val="100000"/>
+              </a:lnSpc>
+              <a:spcBef>
+                <a:spcPts val="0"/>
+              </a:spcBef>
+              <a:spcAft>
+                <a:spcPts val="0"/>
+              </a:spcAft>
+              <a:buClrTx/>
+              <a:buSzTx/>
+              <a:buFontTx/>
+              <a:buNone/>
+              <a:tabLst/>
+              <a:defRPr/>
+            </a:pPr>
+            <a:r>
+              <a:rPr lang="en-US" dirty="0" smtClean="0"/>
+              <a:t>Now we have all nicely setup , we have few libraries</a:t>
+            </a:r>
+            <a:r>
+              <a:rPr lang="en-US" baseline="0" dirty="0" smtClean="0"/>
+              <a:t> and helpers that give use we abstracted all the functionality in shared pipelines</a:t>
+            </a:r>
+          </a:p>
+          <a:p>
+            <a:pPr marL="0" marR="0" indent="0" algn="l" defTabSz="457200" rtl="0" eaLnBrk="1" fontAlgn="auto" latinLnBrk="0" hangingPunct="1">
+              <a:lnSpc>
+                <a:spcPct val="100000"/>
+              </a:lnSpc>
+              <a:spcBef>
+                <a:spcPts val="0"/>
+              </a:spcBef>
+              <a:spcAft>
+                <a:spcPts val="0"/>
+              </a:spcAft>
+              <a:buClrTx/>
+              <a:buSzTx/>
+              <a:buFontTx/>
+              <a:buNone/>
+              <a:tabLst/>
+              <a:defRPr/>
+            </a:pPr>
+            <a:r>
+              <a:rPr lang="en-US" baseline="0" dirty="0" smtClean="0"/>
+              <a:t>And now we write a pipelines like this.</a:t>
+            </a:r>
+          </a:p>
+          <a:p>
+            <a:pPr marL="0" marR="0" indent="0" algn="l" defTabSz="457200" rtl="0" eaLnBrk="1" fontAlgn="auto" latinLnBrk="0" hangingPunct="1">
+              <a:lnSpc>
+                <a:spcPct val="100000"/>
+              </a:lnSpc>
+              <a:spcBef>
+                <a:spcPts val="0"/>
+              </a:spcBef>
+              <a:spcAft>
+                <a:spcPts val="0"/>
+              </a:spcAft>
+              <a:buClrTx/>
+              <a:buSzTx/>
+              <a:buFontTx/>
+              <a:buNone/>
+              <a:tabLst/>
+              <a:defRPr/>
+            </a:pPr>
+            <a:r>
+              <a:rPr lang="en-US" baseline="0" dirty="0" smtClean="0"/>
+              <a:t>***Show </a:t>
+            </a:r>
+            <a:r>
+              <a:rPr lang="en-US" baseline="0" dirty="0" err="1" smtClean="0"/>
+              <a:t>stefano</a:t>
+            </a:r>
+            <a:r>
+              <a:rPr lang="en-US" baseline="0" dirty="0" smtClean="0"/>
+              <a:t> pipeline</a:t>
+            </a:r>
+          </a:p>
+          <a:p>
+            <a:pPr marL="0" marR="0" indent="0" algn="l" defTabSz="457200" rtl="0" eaLnBrk="1" fontAlgn="auto" latinLnBrk="0" hangingPunct="1">
+              <a:lnSpc>
+                <a:spcPct val="100000"/>
+              </a:lnSpc>
+              <a:spcBef>
+                <a:spcPts val="0"/>
+              </a:spcBef>
+              <a:spcAft>
+                <a:spcPts val="0"/>
+              </a:spcAft>
+              <a:buClrTx/>
+              <a:buSzTx/>
+              <a:buFontTx/>
+              <a:buNone/>
+              <a:tabLst/>
+              <a:defRPr/>
+            </a:pPr>
+            <a:r>
+              <a:rPr lang="en-US" baseline="0" dirty="0" smtClean="0"/>
+              <a:t>And it does that.!! </a:t>
+            </a:r>
+          </a:p>
+          <a:p>
+            <a:pPr marL="0" marR="0" indent="0" algn="l" defTabSz="457200" rtl="0" eaLnBrk="1" fontAlgn="auto" latinLnBrk="0" hangingPunct="1">
+              <a:lnSpc>
+                <a:spcPct val="100000"/>
+              </a:lnSpc>
+              <a:spcBef>
+                <a:spcPts val="0"/>
+              </a:spcBef>
+              <a:spcAft>
+                <a:spcPts val="0"/>
+              </a:spcAft>
+              <a:buClrTx/>
+              <a:buSzTx/>
+              <a:buFontTx/>
+              <a:buNone/>
+              <a:tabLst/>
+              <a:defRPr/>
+            </a:pPr>
+            <a:r>
+              <a:rPr lang="en-US" baseline="0" dirty="0" smtClean="0"/>
+              <a:t>Explain what it does… farm ..input step lightweight executors….</a:t>
+            </a:r>
+          </a:p>
+          <a:p>
+            <a:pPr marL="0" marR="0" indent="0" algn="l" defTabSz="457200" rtl="0" eaLnBrk="1" fontAlgn="auto" latinLnBrk="0" hangingPunct="1">
+              <a:lnSpc>
+                <a:spcPct val="100000"/>
+              </a:lnSpc>
+              <a:spcBef>
+                <a:spcPts val="0"/>
+              </a:spcBef>
+              <a:spcAft>
+                <a:spcPts val="0"/>
+              </a:spcAft>
+              <a:buClrTx/>
+              <a:buSzTx/>
+              <a:buFontTx/>
+              <a:buNone/>
+              <a:tabLst/>
+              <a:defRPr/>
+            </a:pPr>
+            <a:endParaRPr lang="en-US" baseline="0" dirty="0" smtClean="0"/>
+          </a:p>
+          <a:p>
+            <a:pPr marL="0" marR="0" indent="0" algn="l" defTabSz="457200" rtl="0" eaLnBrk="1" fontAlgn="auto" latinLnBrk="0" hangingPunct="1">
+              <a:lnSpc>
+                <a:spcPct val="100000"/>
+              </a:lnSpc>
+              <a:spcBef>
+                <a:spcPts val="0"/>
+              </a:spcBef>
+              <a:spcAft>
+                <a:spcPts val="0"/>
+              </a:spcAft>
+              <a:buClrTx/>
+              <a:buSzTx/>
+              <a:buFontTx/>
+              <a:buNone/>
+              <a:tabLst/>
+              <a:defRPr/>
+            </a:pPr>
+            <a:r>
+              <a:rPr lang="en-US" baseline="0" dirty="0" smtClean="0"/>
+              <a:t>Now we easily add another 10 projects that use the same workflow we are happy ( happy slide -&gt; paradise) Cloud cooks </a:t>
+            </a:r>
+            <a:r>
+              <a:rPr lang="en-US" baseline="0" dirty="0" err="1" smtClean="0"/>
+              <a:t>loand</a:t>
+            </a:r>
+            <a:r>
+              <a:rPr lang="en-US" baseline="0" dirty="0" smtClean="0"/>
+              <a:t>!!!  </a:t>
+            </a:r>
+          </a:p>
+          <a:p>
+            <a:pPr marL="0" marR="0" indent="0" algn="l" defTabSz="457200" rtl="0" eaLnBrk="1" fontAlgn="auto" latinLnBrk="0" hangingPunct="1">
+              <a:lnSpc>
+                <a:spcPct val="100000"/>
+              </a:lnSpc>
+              <a:spcBef>
+                <a:spcPts val="0"/>
+              </a:spcBef>
+              <a:spcAft>
+                <a:spcPts val="0"/>
+              </a:spcAft>
+              <a:buClrTx/>
+              <a:buSzTx/>
+              <a:buFontTx/>
+              <a:buNone/>
+              <a:tabLst/>
+              <a:defRPr/>
+            </a:pPr>
+            <a:r>
+              <a:rPr lang="en-US" baseline="0" dirty="0" smtClean="0"/>
+              <a:t>Now comes a developer and want to add something do an extra step, he goes change the code and introduced a bug.. Now all hour beautiful pipelines get destroyed (Cloud land destroyed)</a:t>
+            </a:r>
+            <a:endParaRPr lang="en-US" dirty="0" smtClean="0"/>
+          </a:p>
+          <a:p>
+            <a:endParaRPr lang="en-US" baseline="0" dirty="0" smtClean="0"/>
+          </a:p>
+          <a:p>
+            <a:r>
+              <a:rPr lang="en-US" baseline="0" dirty="0" smtClean="0"/>
+              <a:t>That’s when you need to start using branches of your </a:t>
+            </a:r>
+            <a:r>
+              <a:rPr lang="en-US" baseline="0" dirty="0" err="1" smtClean="0"/>
+              <a:t>piepeline</a:t>
+            </a:r>
+            <a:endParaRPr lang="en-US" dirty="0" smtClean="0"/>
+          </a:p>
+        </p:txBody>
+      </p:sp>
+      <p:sp>
+        <p:nvSpPr>
+          <p:cNvPr id="4" name="Slide Number Placeholder 3"/>
+          <p:cNvSpPr>
+            <a:spLocks noGrp="1"/>
+          </p:cNvSpPr>
+          <p:nvPr>
+            <p:ph type="sldNum" sz="quarter" idx="10"/>
+          </p:nvPr>
+        </p:nvSpPr>
+        <p:spPr/>
+        <p:txBody>
+          <a:bodyPr/>
+          <a:lstStyle/>
+          <a:p>
+            <a:fld id="{FCA57A33-9D30-664B-8074-27A1C6B8A605}" type="slidenum">
+              <a:rPr lang="en-US" smtClean="0"/>
+              <a:t>10</a:t>
+            </a:fld>
+            <a:endParaRPr lang="en-US"/>
+          </a:p>
+        </p:txBody>
+      </p:sp>
+    </p:spTree>
+    <p:extLst>
+      <p:ext uri="{BB962C8B-B14F-4D97-AF65-F5344CB8AC3E}">
+        <p14:creationId xmlns:p14="http://schemas.microsoft.com/office/powerpoint/2010/main" val="77718029"/>
+      </p:ext>
+    </p:extLst>
+  </p:cSld>
+  <p:clrMapOvr>
+    <a:masterClrMapping/>
+  </p:clrMapOvr>
+</p:notes>
+</file>
+
+<file path=ppt/notesSlides/notesSlide11.xml><?xml version="1.0" encoding="utf-8"?>
+<p:notes xmlns:a="http://schemas.openxmlformats.org/drawingml/2006/main" xmlns:r="http://schemas.openxmlformats.org/officeDocument/2006/relationships" xmlns:p="http://schemas.openxmlformats.org/presentationml/2006/main">
+  <p:cSld>
+    <p:spTree>
+      <p:nvGrpSpPr>
+        <p:cNvPr id="1" name=""/>
+        <p:cNvGrpSpPr/>
+        <p:nvPr/>
+      </p:nvGrpSpPr>
+      <p:grpSpPr>
+        <a:xfrm>
+          <a:off x="0" y="0"/>
+          <a:ext cx="0" cy="0"/>
+          <a:chOff x="0" y="0"/>
+          <a:chExt cx="0" cy="0"/>
+        </a:xfrm>
+      </p:grpSpPr>
+      <p:sp>
+        <p:nvSpPr>
+          <p:cNvPr id="2" name="Slide Image Placeholder 1"/>
+          <p:cNvSpPr>
+            <a:spLocks noGrp="1" noRot="1" noChangeAspect="1"/>
+          </p:cNvSpPr>
+          <p:nvPr>
+            <p:ph type="sldImg"/>
+          </p:nvPr>
+        </p:nvSpPr>
+        <p:spPr/>
+      </p:sp>
+      <p:sp>
+        <p:nvSpPr>
+          <p:cNvPr id="3" name="Notes Placeholder 2"/>
+          <p:cNvSpPr>
+            <a:spLocks noGrp="1"/>
+          </p:cNvSpPr>
+          <p:nvPr>
+            <p:ph type="body" idx="1"/>
+          </p:nvPr>
+        </p:nvSpPr>
+        <p:spPr/>
+        <p:txBody>
+          <a:bodyPr/>
+          <a:lstStyle/>
+          <a:p>
+            <a:r>
+              <a:rPr lang="en-US" dirty="0" smtClean="0"/>
+              <a:t>Other more secure/restrictive</a:t>
+            </a:r>
+            <a:r>
+              <a:rPr lang="en-US" baseline="0" dirty="0" smtClean="0"/>
+              <a:t> way will be in the configuration to set a </a:t>
+            </a:r>
+            <a:endParaRPr lang="en-US" dirty="0"/>
+          </a:p>
+        </p:txBody>
+      </p:sp>
+      <p:sp>
+        <p:nvSpPr>
+          <p:cNvPr id="4" name="Slide Number Placeholder 3"/>
+          <p:cNvSpPr>
+            <a:spLocks noGrp="1"/>
+          </p:cNvSpPr>
+          <p:nvPr>
+            <p:ph type="sldNum" sz="quarter" idx="10"/>
+          </p:nvPr>
+        </p:nvSpPr>
+        <p:spPr/>
+        <p:txBody>
+          <a:bodyPr/>
+          <a:lstStyle/>
+          <a:p>
+            <a:fld id="{FCA57A33-9D30-664B-8074-27A1C6B8A605}" type="slidenum">
+              <a:rPr lang="en-US" smtClean="0"/>
+              <a:t>11</a:t>
+            </a:fld>
+            <a:endParaRPr lang="en-US"/>
+          </a:p>
+        </p:txBody>
+      </p:sp>
+    </p:spTree>
+    <p:extLst>
+      <p:ext uri="{BB962C8B-B14F-4D97-AF65-F5344CB8AC3E}">
+        <p14:creationId xmlns:p14="http://schemas.microsoft.com/office/powerpoint/2010/main" val="767306591"/>
+      </p:ext>
+    </p:extLst>
+  </p:cSld>
+  <p:clrMapOvr>
+    <a:masterClrMapping/>
+  </p:clrMapOvr>
+</p:notes>
+</file>
+
+<file path=ppt/notesSlides/notesSlide12.xml><?xml version="1.0" encoding="utf-8"?>
+<p:notes xmlns:a="http://schemas.openxmlformats.org/drawingml/2006/main" xmlns:r="http://schemas.openxmlformats.org/officeDocument/2006/relationships" xmlns:p="http://schemas.openxmlformats.org/presentationml/2006/main">
+  <p:cSld>
+    <p:spTree>
+      <p:nvGrpSpPr>
+        <p:cNvPr id="1" name=""/>
+        <p:cNvGrpSpPr/>
+        <p:nvPr/>
+      </p:nvGrpSpPr>
+      <p:grpSpPr>
+        <a:xfrm>
+          <a:off x="0" y="0"/>
+          <a:ext cx="0" cy="0"/>
+          <a:chOff x="0" y="0"/>
+          <a:chExt cx="0" cy="0"/>
+        </a:xfrm>
+      </p:grpSpPr>
+      <p:sp>
+        <p:nvSpPr>
+          <p:cNvPr id="2" name="Slide Image Placeholder 1"/>
+          <p:cNvSpPr>
+            <a:spLocks noGrp="1" noRot="1" noChangeAspect="1"/>
+          </p:cNvSpPr>
+          <p:nvPr>
+            <p:ph type="sldImg"/>
+          </p:nvPr>
+        </p:nvSpPr>
+        <p:spPr/>
+      </p:sp>
+      <p:sp>
+        <p:nvSpPr>
+          <p:cNvPr id="3" name="Notes Placeholder 2"/>
+          <p:cNvSpPr>
+            <a:spLocks noGrp="1"/>
+          </p:cNvSpPr>
+          <p:nvPr>
+            <p:ph type="body" idx="1"/>
+          </p:nvPr>
+        </p:nvSpPr>
+        <p:spPr/>
+        <p:txBody>
+          <a:bodyPr/>
+          <a:lstStyle/>
+          <a:p>
+            <a:r>
+              <a:rPr lang="en-US" dirty="0" smtClean="0"/>
+              <a:t>Even if they were intended to be instance. The Groovy compiler in this case can produce confusing error messages.</a:t>
+            </a:r>
+          </a:p>
+          <a:p>
+            <a:r>
+              <a:rPr lang="en-US" dirty="0" smtClean="0"/>
+              <a:t>Use the _ at the end of the library directive</a:t>
+            </a:r>
+          </a:p>
+          <a:p>
+            <a:endParaRPr lang="en-US" dirty="0" smtClean="0"/>
+          </a:p>
+          <a:p>
+            <a:r>
+              <a:rPr lang="en-US" dirty="0" smtClean="0"/>
+              <a:t>Workflow use library</a:t>
+            </a:r>
+            <a:r>
+              <a:rPr lang="en-US" baseline="0" dirty="0" smtClean="0"/>
+              <a:t> instead of pipeline editor (in reply) If you are using things from the library that can </a:t>
+            </a:r>
+          </a:p>
+          <a:p>
+            <a:endParaRPr lang="en-US" baseline="0" dirty="0" smtClean="0"/>
+          </a:p>
+          <a:p>
+            <a:r>
+              <a:rPr lang="en-US" baseline="0" dirty="0" smtClean="0"/>
+              <a:t>They have the potential of destructing all your pipelines at once.</a:t>
+            </a:r>
+            <a:r>
+              <a:rPr lang="en-US" b="1" baseline="0" dirty="0" smtClean="0"/>
+              <a:t> And also they pose a security concerns.</a:t>
+            </a:r>
+            <a:endParaRPr lang="en-US" b="1" dirty="0"/>
+          </a:p>
+        </p:txBody>
+      </p:sp>
+      <p:sp>
+        <p:nvSpPr>
+          <p:cNvPr id="4" name="Slide Number Placeholder 3"/>
+          <p:cNvSpPr>
+            <a:spLocks noGrp="1"/>
+          </p:cNvSpPr>
+          <p:nvPr>
+            <p:ph type="sldNum" sz="quarter" idx="10"/>
+          </p:nvPr>
+        </p:nvSpPr>
+        <p:spPr/>
+        <p:txBody>
+          <a:bodyPr/>
+          <a:lstStyle/>
+          <a:p>
+            <a:fld id="{FCA57A33-9D30-664B-8074-27A1C6B8A605}" type="slidenum">
+              <a:rPr lang="en-US" smtClean="0"/>
+              <a:t>12</a:t>
+            </a:fld>
+            <a:endParaRPr lang="en-US"/>
+          </a:p>
+        </p:txBody>
+      </p:sp>
+    </p:spTree>
+    <p:extLst>
+      <p:ext uri="{BB962C8B-B14F-4D97-AF65-F5344CB8AC3E}">
+        <p14:creationId xmlns:p14="http://schemas.microsoft.com/office/powerpoint/2010/main" val="1736824288"/>
+      </p:ext>
+    </p:extLst>
+  </p:cSld>
+  <p:clrMapOvr>
+    <a:masterClrMapping/>
+  </p:clrMapOvr>
+</p:notes>
+</file>
+
+<file path=ppt/notesSlides/notesSlide13.xml><?xml version="1.0" encoding="utf-8"?>
+<p:notes xmlns:a="http://schemas.openxmlformats.org/drawingml/2006/main" xmlns:r="http://schemas.openxmlformats.org/officeDocument/2006/relationships" xmlns:p="http://schemas.openxmlformats.org/presentationml/2006/main">
+  <p:cSld>
+    <p:spTree>
+      <p:nvGrpSpPr>
+        <p:cNvPr id="1" name=""/>
+        <p:cNvGrpSpPr/>
+        <p:nvPr/>
+      </p:nvGrpSpPr>
+      <p:grpSpPr>
+        <a:xfrm>
+          <a:off x="0" y="0"/>
+          <a:ext cx="0" cy="0"/>
+          <a:chOff x="0" y="0"/>
+          <a:chExt cx="0" cy="0"/>
+        </a:xfrm>
+      </p:grpSpPr>
+      <p:sp>
+        <p:nvSpPr>
+          <p:cNvPr id="2" name="Slide Image Placeholder 1"/>
+          <p:cNvSpPr>
+            <a:spLocks noGrp="1" noRot="1" noChangeAspect="1"/>
+          </p:cNvSpPr>
+          <p:nvPr>
+            <p:ph type="sldImg"/>
+          </p:nvPr>
+        </p:nvSpPr>
+        <p:spPr/>
+      </p:sp>
+      <p:sp>
+        <p:nvSpPr>
+          <p:cNvPr id="3" name="Notes Placeholder 2"/>
+          <p:cNvSpPr>
+            <a:spLocks noGrp="1"/>
+          </p:cNvSpPr>
+          <p:nvPr>
+            <p:ph type="body" idx="1"/>
+          </p:nvPr>
+        </p:nvSpPr>
+        <p:spPr/>
+        <p:txBody>
+          <a:bodyPr/>
+          <a:lstStyle/>
+          <a:p>
+            <a:r>
+              <a:rPr lang="en-US" dirty="0" smtClean="0"/>
+              <a:t>A variable defined in a shared library will only show up in Global Variables Reference (under Pipeline Syntax) after Jenkins loads and uses that library as part of a successful Pipeline run.</a:t>
+            </a:r>
+          </a:p>
+          <a:p>
+            <a:r>
+              <a:rPr lang="en-US" dirty="0" smtClean="0"/>
+              <a:t>Show example!!</a:t>
+            </a:r>
+          </a:p>
+          <a:p>
+            <a:endParaRPr lang="en-US" dirty="0"/>
+          </a:p>
+        </p:txBody>
+      </p:sp>
+      <p:sp>
+        <p:nvSpPr>
+          <p:cNvPr id="4" name="Slide Number Placeholder 3"/>
+          <p:cNvSpPr>
+            <a:spLocks noGrp="1"/>
+          </p:cNvSpPr>
+          <p:nvPr>
+            <p:ph type="sldNum" sz="quarter" idx="10"/>
+          </p:nvPr>
+        </p:nvSpPr>
+        <p:spPr/>
+        <p:txBody>
+          <a:bodyPr/>
+          <a:lstStyle/>
+          <a:p>
+            <a:fld id="{FCA57A33-9D30-664B-8074-27A1C6B8A605}" type="slidenum">
+              <a:rPr lang="en-US" smtClean="0"/>
+              <a:t>13</a:t>
+            </a:fld>
+            <a:endParaRPr lang="en-US"/>
+          </a:p>
+        </p:txBody>
+      </p:sp>
+    </p:spTree>
+    <p:extLst>
+      <p:ext uri="{BB962C8B-B14F-4D97-AF65-F5344CB8AC3E}">
+        <p14:creationId xmlns:p14="http://schemas.microsoft.com/office/powerpoint/2010/main" val="1928613577"/>
+      </p:ext>
+    </p:extLst>
+  </p:cSld>
+  <p:clrMapOvr>
+    <a:masterClrMapping/>
+  </p:clrMapOvr>
+</p:notes>
+</file>
+
+<file path=ppt/notesSlides/notesSlide14.xml><?xml version="1.0" encoding="utf-8"?>
+<p:notes xmlns:a="http://schemas.openxmlformats.org/drawingml/2006/main" xmlns:r="http://schemas.openxmlformats.org/officeDocument/2006/relationships" xmlns:p="http://schemas.openxmlformats.org/presentationml/2006/main">
+  <p:cSld>
+    <p:spTree>
+      <p:nvGrpSpPr>
+        <p:cNvPr id="1" name=""/>
+        <p:cNvGrpSpPr/>
+        <p:nvPr/>
+      </p:nvGrpSpPr>
+      <p:grpSpPr>
+        <a:xfrm>
+          <a:off x="0" y="0"/>
+          <a:ext cx="0" cy="0"/>
+          <a:chOff x="0" y="0"/>
+          <a:chExt cx="0" cy="0"/>
+        </a:xfrm>
+      </p:grpSpPr>
+      <p:sp>
+        <p:nvSpPr>
+          <p:cNvPr id="2" name="Slide Image Placeholder 1"/>
+          <p:cNvSpPr>
+            <a:spLocks noGrp="1" noRot="1" noChangeAspect="1"/>
+          </p:cNvSpPr>
+          <p:nvPr>
+            <p:ph type="sldImg"/>
+          </p:nvPr>
+        </p:nvSpPr>
+        <p:spPr/>
+      </p:sp>
+      <p:sp>
+        <p:nvSpPr>
+          <p:cNvPr id="3" name="Notes Placeholder 2"/>
+          <p:cNvSpPr>
+            <a:spLocks noGrp="1"/>
+          </p:cNvSpPr>
+          <p:nvPr>
+            <p:ph type="body" idx="1"/>
+          </p:nvPr>
+        </p:nvSpPr>
+        <p:spPr/>
+        <p:txBody>
+          <a:bodyPr/>
+          <a:lstStyle/>
+          <a:p>
+            <a:r>
+              <a:rPr lang="en-US" dirty="0" smtClean="0"/>
+              <a:t>Folder-level Shared Libraries</a:t>
+            </a:r>
+          </a:p>
+          <a:p>
+            <a:r>
+              <a:rPr lang="en-US" dirty="0" smtClean="0"/>
+              <a:t>Any Folder created can have Shared Libraries associated with it. This mechanism allows scoping of specific libraries to all the Pipelines inside of the folder or subfolder.</a:t>
+            </a:r>
+          </a:p>
+          <a:p>
+            <a:endParaRPr lang="en-US" dirty="0" smtClean="0"/>
+          </a:p>
+          <a:p>
+            <a:r>
+              <a:rPr lang="en-US" dirty="0" smtClean="0"/>
+              <a:t>Folder-based libraries are not considered "trusted:" they run in the Groovy sandbox just like typical Pipelines.</a:t>
+            </a:r>
+          </a:p>
+          <a:p>
+            <a:endParaRPr lang="en-US" dirty="0" smtClean="0"/>
+          </a:p>
+          <a:p>
+            <a:r>
+              <a:rPr lang="en-US" dirty="0" err="1" smtClean="0"/>
+              <a:t>Dinamic</a:t>
+            </a:r>
+            <a:r>
+              <a:rPr lang="en-US" baseline="0" dirty="0" smtClean="0"/>
+              <a:t> retrieval</a:t>
+            </a:r>
+          </a:p>
+          <a:p>
+            <a:r>
+              <a:rPr lang="en-US" baseline="0" dirty="0" smtClean="0"/>
+              <a:t>Usually you define in Jenkins your shared libraries, but there is a way to retrieve a shared library dynamically without </a:t>
+            </a:r>
+            <a:r>
+              <a:rPr lang="en-US" baseline="0" dirty="0" err="1" smtClean="0"/>
+              <a:t>jenkins</a:t>
+            </a:r>
+            <a:r>
+              <a:rPr lang="en-US" baseline="0" dirty="0" smtClean="0"/>
+              <a:t> know about it. The syntax is hard to </a:t>
+            </a:r>
+            <a:r>
+              <a:rPr lang="en-US" baseline="0" dirty="0" err="1" smtClean="0"/>
+              <a:t>remmeber</a:t>
+            </a:r>
+            <a:r>
+              <a:rPr lang="en-US" baseline="0" dirty="0" smtClean="0"/>
+              <a:t> you can look that in the documentation. We haven’t had the need to use it. But I have it on the back of my mind in case someone propose me an use case. Like this.</a:t>
+            </a:r>
+          </a:p>
+        </p:txBody>
+      </p:sp>
+      <p:sp>
+        <p:nvSpPr>
+          <p:cNvPr id="4" name="Slide Number Placeholder 3"/>
+          <p:cNvSpPr>
+            <a:spLocks noGrp="1"/>
+          </p:cNvSpPr>
+          <p:nvPr>
+            <p:ph type="sldNum" sz="quarter" idx="10"/>
+          </p:nvPr>
+        </p:nvSpPr>
+        <p:spPr/>
+        <p:txBody>
+          <a:bodyPr/>
+          <a:lstStyle/>
+          <a:p>
+            <a:fld id="{FCA57A33-9D30-664B-8074-27A1C6B8A605}" type="slidenum">
+              <a:rPr lang="en-US" smtClean="0"/>
+              <a:t>14</a:t>
+            </a:fld>
+            <a:endParaRPr lang="en-US"/>
+          </a:p>
+        </p:txBody>
+      </p:sp>
+    </p:spTree>
+    <p:extLst>
+      <p:ext uri="{BB962C8B-B14F-4D97-AF65-F5344CB8AC3E}">
+        <p14:creationId xmlns:p14="http://schemas.microsoft.com/office/powerpoint/2010/main" val="515970923"/>
       </p:ext>
     </p:extLst>
   </p:cSld>
@@ -900,6 +1643,45 @@
             </a:r>
           </a:p>
           <a:p>
+            <a:endParaRPr lang="en-US" baseline="0" dirty="0" smtClean="0"/>
+          </a:p>
+          <a:p>
+            <a:endParaRPr lang="en-US" baseline="0" dirty="0" smtClean="0"/>
+          </a:p>
+          <a:p>
+            <a:r>
+              <a:rPr lang="en-US" baseline="0" dirty="0" smtClean="0"/>
+              <a:t>And to avoid monster pipelines!!!!</a:t>
+            </a:r>
+          </a:p>
+          <a:p>
+            <a:r>
+              <a:rPr lang="en-US" baseline="0" dirty="0" smtClean="0"/>
+              <a:t>Show examples..</a:t>
+            </a:r>
+          </a:p>
+          <a:p>
+            <a:endParaRPr lang="en-US" baseline="0" dirty="0" smtClean="0"/>
+          </a:p>
+          <a:p>
+            <a:r>
+              <a:rPr lang="en-US" baseline="0" dirty="0" smtClean="0"/>
+              <a:t>Analogy of pipelines making a movie -</a:t>
+            </a:r>
+            <a:r>
+              <a:rPr lang="en-US" baseline="0" dirty="0" smtClean="0">
+                <a:sym typeface="Wingdings"/>
+              </a:rPr>
+              <a:t> pipelines to build /test/deploy.</a:t>
+            </a:r>
+          </a:p>
+          <a:p>
+            <a:r>
+              <a:rPr lang="en-US" baseline="0" dirty="0" smtClean="0">
+                <a:sym typeface="Wingdings"/>
+              </a:rPr>
+              <a:t>Against our pipeline that go to test build and use the farm</a:t>
+            </a:r>
             <a:endParaRPr lang="en-US" baseline="0" dirty="0" smtClean="0"/>
           </a:p>
         </p:txBody>
@@ -1246,11 +2028,36 @@
               <a:rPr lang="en-US" baseline="0" dirty="0" smtClean="0"/>
               <a:t>One particular note here is that this shared pipeline are not sandboxed, so if you have being hitting this annoying thing that need to approve each groovy method on the </a:t>
             </a:r>
+            <a:r>
+              <a:rPr lang="en-US" b="1" baseline="0" dirty="0" smtClean="0"/>
+              <a:t>In-process Script Approval</a:t>
+            </a:r>
           </a:p>
           <a:p>
             <a:endParaRPr lang="en-US" baseline="0" dirty="0" smtClean="0"/>
           </a:p>
           <a:p>
+            <a:endParaRPr lang="en-US" baseline="0" dirty="0" smtClean="0"/>
+          </a:p>
+          <a:p>
+            <a:r>
+              <a:rPr lang="en-US" baseline="0" dirty="0" smtClean="0"/>
+              <a:t>These libraries are considered "trusted:" they can run any methods in Java, Groovy, Jenkins internal APIs, Jenkins plugins, or third-party libraries. This allows you to define libraries which encapsulate individually unsafe APIs in a higher-level wrapper safe for use from any Pipeline. Beware that anyone able to push commits to this SCM repository could obtain unlimited access to Jenkins. </a:t>
+            </a:r>
+          </a:p>
+          <a:p>
+            <a:endParaRPr lang="en-US" baseline="0" dirty="0" smtClean="0"/>
+          </a:p>
+          <a:p>
+            <a:r>
+              <a:rPr lang="en-US" baseline="0" dirty="0" smtClean="0"/>
+              <a:t>Furthermore, if you specify a version in Jenkins configuration, you can block scripts from selecting a different version</a:t>
+            </a:r>
+          </a:p>
+          <a:p>
+            <a:endParaRPr lang="en-US" baseline="0" dirty="0" smtClean="0"/>
+          </a:p>
+          <a:p>
             <a:r>
               <a:rPr lang="en-US" baseline="0" dirty="0" smtClean="0"/>
               <a:t>We have not setup our Shared library.  You can define as many as you want.</a:t>
@@ -1276,6 +2083,12 @@
               <a:rPr lang="en-US" baseline="0" dirty="0" smtClean="0"/>
               <a:t>So that brings us to the next slide, What is the library structure</a:t>
             </a:r>
+          </a:p>
+          <a:p>
+            <a:endParaRPr lang="en-US" baseline="0" dirty="0" smtClean="0"/>
+          </a:p>
+          <a:p>
+            <a:endParaRPr lang="en-US" baseline="0" dirty="0" smtClean="0"/>
           </a:p>
         </p:txBody>
       </p:sp>
@@ -1477,7 +2290,7 @@
             </a:r>
             <a:r>
               <a:rPr lang="en-US" baseline="0" dirty="0" smtClean="0"/>
-              <a:t> we are using the most, since from our team of 30-40 developers only 10 are java developers .</a:t>
+              <a:t> we are using the most, since from our team of 30-40 developers only 10 are java developers . Most of the people writing pipelines come from python, so not much structured Java</a:t>
             </a:r>
           </a:p>
           <a:p>
@@ -1520,19 +2333,19 @@
             </a:pPr>
             <a:r>
               <a:rPr lang="en-US" dirty="0" smtClean="0"/>
-              <a:t>The </a:t>
-            </a:r>
-            <a:r>
-              <a:rPr lang="en-US" dirty="0" err="1" smtClean="0"/>
-              <a:t>basename</a:t>
-            </a:r>
-            <a:r>
-              <a:rPr lang="en-US" dirty="0" smtClean="0"/>
-              <a:t> of each *.groovy file should be a Groovy.  The txt is optional but I recommend that you always</a:t>
-            </a:r>
-            <a:r>
-              <a:rPr lang="en-US" baseline="0" dirty="0" smtClean="0"/>
-              <a:t> document them because that documentation is displayed in the UI, so users can just have  a look there to see what is available and how to use it.</a:t>
+              <a:t>To be picked up you need </a:t>
+            </a:r>
+            <a:r>
+              <a:rPr lang="en-US" baseline="0" dirty="0" smtClean="0"/>
+              <a:t> the files to be .groovy. </a:t>
+            </a:r>
+            <a:r>
+              <a:rPr lang="en-US" dirty="0" smtClean="0"/>
+              <a:t>The matching txt file is optional but I recommend that you always</a:t>
+            </a:r>
+            <a:r>
+              <a:rPr lang="en-US" baseline="0" dirty="0" smtClean="0"/>
+              <a:t> document them because that documentation is displayed in the UI and users can just have  a look there to see what is available and how to use it.</a:t>
             </a:r>
           </a:p>
           <a:p>
@@ -1664,10 +2477,7 @@
               <a:tabLst/>
               <a:defRPr/>
             </a:pPr>
-            <a:r>
-              <a:rPr lang="en-US" dirty="0" smtClean="0"/>
-              <a:t>The Groovy source files in these directories get the same “CPS transformation” as in Scripted Pipeline.</a:t>
-            </a:r>
+            <a:endParaRPr lang="en-US" dirty="0" smtClean="0"/>
           </a:p>
           <a:p>
             <a:pPr marL="0" marR="0" indent="0" algn="l" defTabSz="457200" rtl="0" eaLnBrk="1" fontAlgn="auto" latinLnBrk="0" hangingPunct="1">
@@ -1687,7 +2497,10 @@
               <a:tabLst/>
               <a:defRPr/>
             </a:pPr>
-            <a:endParaRPr lang="en-US" dirty="0" smtClean="0"/>
+            <a:r>
+              <a:rPr lang="en-US" b="1" dirty="0" smtClean="0"/>
+              <a:t>The Groovy source files in these directories get the same “CPS transformation” as in Scripted Pipeline.</a:t>
+            </a:r>
           </a:p>
           <a:p>
             <a:pPr marL="0" marR="0" indent="0" algn="l" defTabSz="457200" rtl="0" eaLnBrk="1" fontAlgn="auto" latinLnBrk="0" hangingPunct="1">
@@ -1707,18 +2520,7 @@
               <a:tabLst/>
               <a:defRPr/>
             </a:pPr>
-            <a:r>
-              <a:rPr lang="en-US" dirty="0" smtClean="0"/>
-              <a:t>A resources directory allows the </a:t>
-            </a:r>
-            <a:r>
-              <a:rPr lang="en-US" dirty="0" err="1" smtClean="0"/>
-              <a:t>libraryResource</a:t>
-            </a:r>
-            <a:r>
-              <a:rPr lang="en-US" dirty="0" smtClean="0"/>
-              <a:t> step to be used from an external library to load associated non-Groovy files. Currently this feature is not supported for internal libraries.</a:t>
-            </a:r>
+            <a:endParaRPr lang="en-US" dirty="0" smtClean="0"/>
           </a:p>
           <a:p>
             <a:pPr marL="0" marR="0" indent="0" algn="l" defTabSz="457200" rtl="0" eaLnBrk="1" fontAlgn="auto" latinLnBrk="0" hangingPunct="1">
@@ -1738,7 +2540,18 @@
               <a:tabLst/>
               <a:defRPr/>
             </a:pPr>
-            <a:endParaRPr lang="en-US" dirty="0" smtClean="0"/>
+            <a:r>
+              <a:rPr lang="en-US" dirty="0" smtClean="0"/>
+              <a:t>A resources directory allows the </a:t>
+            </a:r>
+            <a:r>
+              <a:rPr lang="en-US" dirty="0" err="1" smtClean="0"/>
+              <a:t>libraryResource</a:t>
+            </a:r>
+            <a:r>
+              <a:rPr lang="en-US" dirty="0" smtClean="0"/>
+              <a:t> step to be used from an external library to load associated non-Groovy files. Currently this feature is not supported for internal libraries.</a:t>
+            </a:r>
           </a:p>
           <a:p>
             <a:pPr marL="0" marR="0" indent="0" algn="l" defTabSz="457200" rtl="0" eaLnBrk="1" fontAlgn="auto" latinLnBrk="0" hangingPunct="1">
@@ -1758,14 +2571,7 @@
               <a:tabLst/>
               <a:defRPr/>
             </a:pPr>
-            <a:r>
-              <a:rPr lang="en-US" dirty="0" smtClean="0"/>
-              <a:t>Go ahead and create those</a:t>
-            </a:r>
-            <a:r>
-              <a:rPr lang="en-US" baseline="0" dirty="0" smtClean="0"/>
-              <a:t> folders (have then created on a branch.. And just merge the code to master)</a:t>
-            </a:r>
+            <a:endParaRPr lang="en-US" dirty="0" smtClean="0"/>
           </a:p>
           <a:p>
             <a:pPr marL="0" marR="0" indent="0" algn="l" defTabSz="457200" rtl="0" eaLnBrk="1" fontAlgn="auto" latinLnBrk="0" hangingPunct="1">
@@ -1785,6 +2591,10 @@
               <a:tabLst/>
               <a:defRPr/>
             </a:pPr>
+            <a:r>
+              <a:rPr lang="en-US" dirty="0" smtClean="0"/>
+              <a:t>Go ahead and create the </a:t>
+            </a:r>
             <a:endParaRPr lang="en-US" dirty="0"/>
           </a:p>
         </p:txBody>
@@ -1816,6 +2626,770 @@
     <p:extLst>
       <p:ext uri="{BB962C8B-B14F-4D97-AF65-F5344CB8AC3E}">
         <p14:creationId xmlns:p14="http://schemas.microsoft.com/office/powerpoint/2010/main" val="2317864228"/>
+      </p:ext>
+    </p:extLst>
+  </p:cSld>
+  <p:clrMapOvr>
+    <a:masterClrMapping/>
+  </p:clrMapOvr>
+</p:notes>
+</file>
+
+<file path=ppt/notesSlides/notesSlide7.xml><?xml version="1.0" encoding="utf-8"?>
+<p:notes xmlns:a="http://schemas.openxmlformats.org/drawingml/2006/main" xmlns:r="http://schemas.openxmlformats.org/officeDocument/2006/relationships" xmlns:p="http://schemas.openxmlformats.org/presentationml/2006/main">
+  <p:cSld>
+    <p:spTree>
+      <p:nvGrpSpPr>
+        <p:cNvPr id="1" name=""/>
+        <p:cNvGrpSpPr/>
+        <p:nvPr/>
+      </p:nvGrpSpPr>
+      <p:grpSpPr>
+        <a:xfrm>
+          <a:off x="0" y="0"/>
+          <a:ext cx="0" cy="0"/>
+          <a:chOff x="0" y="0"/>
+          <a:chExt cx="0" cy="0"/>
+        </a:xfrm>
+      </p:grpSpPr>
+      <p:sp>
+        <p:nvSpPr>
+          <p:cNvPr id="2" name="Slide Image Placeholder 1"/>
+          <p:cNvSpPr>
+            <a:spLocks noGrp="1" noRot="1" noChangeAspect="1"/>
+          </p:cNvSpPr>
+          <p:nvPr>
+            <p:ph type="sldImg"/>
+          </p:nvPr>
+        </p:nvSpPr>
+        <p:spPr/>
+      </p:sp>
+      <p:sp>
+        <p:nvSpPr>
+          <p:cNvPr id="3" name="Notes Placeholder 2"/>
+          <p:cNvSpPr>
+            <a:spLocks noGrp="1"/>
+          </p:cNvSpPr>
+          <p:nvPr>
+            <p:ph type="body" idx="1"/>
+          </p:nvPr>
+        </p:nvSpPr>
+        <p:spPr/>
+        <p:txBody>
+          <a:bodyPr/>
+          <a:lstStyle/>
+          <a:p>
+            <a:r>
+              <a:rPr lang="en-US" dirty="0" smtClean="0"/>
+              <a:t>There is a</a:t>
+            </a:r>
+            <a:r>
+              <a:rPr lang="en-US" baseline="0" dirty="0" smtClean="0"/>
+              <a:t> reason for that _ that took it more than a day to figure it out.  Currently that notation and the explanation is on the main documentation.</a:t>
+            </a:r>
+          </a:p>
+          <a:p>
+            <a:r>
+              <a:rPr lang="en-US" dirty="0" smtClean="0"/>
+              <a:t>What it says is that</a:t>
+            </a:r>
+            <a:r>
+              <a:rPr lang="en-US" baseline="0" dirty="0" smtClean="0"/>
+              <a:t> </a:t>
+            </a:r>
+            <a:r>
+              <a:rPr lang="en-US" dirty="0" smtClean="0"/>
+              <a:t>instead of annotating an unnecessary import statement, the symbol _ is annotated.</a:t>
+            </a:r>
+          </a:p>
+          <a:p>
+            <a:pPr marL="0" marR="0" indent="0" algn="l" defTabSz="457200" rtl="0" eaLnBrk="1" fontAlgn="auto" latinLnBrk="0" hangingPunct="1">
+              <a:lnSpc>
+                <a:spcPct val="100000"/>
+              </a:lnSpc>
+              <a:spcBef>
+                <a:spcPts val="0"/>
+              </a:spcBef>
+              <a:spcAft>
+                <a:spcPts val="0"/>
+              </a:spcAft>
+              <a:buClrTx/>
+              <a:buSzTx/>
+              <a:buFontTx/>
+              <a:buNone/>
+              <a:tabLst/>
+              <a:defRPr/>
+            </a:pPr>
+            <a:endParaRPr lang="en-US" dirty="0" smtClean="0"/>
+          </a:p>
+          <a:p>
+            <a:pPr marL="0" marR="0" indent="0" algn="l" defTabSz="457200" rtl="0" eaLnBrk="1" fontAlgn="auto" latinLnBrk="0" hangingPunct="1">
+              <a:lnSpc>
+                <a:spcPct val="100000"/>
+              </a:lnSpc>
+              <a:spcBef>
+                <a:spcPts val="0"/>
+              </a:spcBef>
+              <a:spcAft>
+                <a:spcPts val="0"/>
+              </a:spcAft>
+              <a:buClrTx/>
+              <a:buSzTx/>
+              <a:buFontTx/>
+              <a:buNone/>
+              <a:tabLst/>
+              <a:defRPr/>
+            </a:pPr>
+            <a:r>
+              <a:rPr lang="en-US" dirty="0" smtClean="0"/>
+              <a:t>For Class</a:t>
+            </a:r>
+            <a:r>
+              <a:rPr lang="en-US" baseline="0" dirty="0" smtClean="0"/>
+              <a:t> libraries the </a:t>
+            </a:r>
+            <a:r>
+              <a:rPr lang="en-US" dirty="0" smtClean="0"/>
+              <a:t>Annotation goes on an import statement</a:t>
+            </a:r>
+          </a:p>
+          <a:p>
+            <a:pPr marL="0" marR="0" indent="0" algn="l" defTabSz="457200" rtl="0" eaLnBrk="1" fontAlgn="auto" latinLnBrk="0" hangingPunct="1">
+              <a:lnSpc>
+                <a:spcPct val="100000"/>
+              </a:lnSpc>
+              <a:spcBef>
+                <a:spcPts val="0"/>
+              </a:spcBef>
+              <a:spcAft>
+                <a:spcPts val="0"/>
+              </a:spcAft>
+              <a:buClrTx/>
+              <a:buSzTx/>
+              <a:buFontTx/>
+              <a:buNone/>
+              <a:tabLst/>
+              <a:defRPr/>
+            </a:pPr>
+            <a:endParaRPr lang="en-US" dirty="0" smtClean="0"/>
+          </a:p>
+          <a:p>
+            <a:endParaRPr lang="en-US" dirty="0" smtClean="0"/>
+          </a:p>
+          <a:p>
+            <a:r>
+              <a:rPr lang="en-US" dirty="0" smtClean="0"/>
+              <a:t>But when</a:t>
+            </a:r>
+            <a:r>
+              <a:rPr lang="en-US" baseline="0" dirty="0" smtClean="0"/>
+              <a:t> I was re-reading the documentation to create this presentation I found that  after one of the release they have created a library step , so you can now at any time in your pipeline call library ‘my-shared-lib’ and after that you can use any method or global variable defined there. ( I tested and works fine)</a:t>
+            </a:r>
+          </a:p>
+          <a:p>
+            <a:endParaRPr lang="en-US" baseline="0" dirty="0" smtClean="0"/>
+          </a:p>
+          <a:p>
+            <a:r>
+              <a:rPr lang="en-US" baseline="0" dirty="0" smtClean="0"/>
+              <a:t>3) The difference is that in when accessing branches of that library you could for example have something like library "my-shared-library@$BRANCH_NAME”</a:t>
+            </a:r>
+          </a:p>
+          <a:p>
+            <a:endParaRPr lang="en-US" dirty="0" smtClean="0"/>
+          </a:p>
+          <a:p>
+            <a:r>
+              <a:rPr lang="en-US" dirty="0" smtClean="0"/>
+              <a:t>4) Libraries are resolved and loaded during compilation of the script, before it starts executing. This allows the Groovy compiler to understand the meaning of symbols used in static type </a:t>
+            </a:r>
+            <a:r>
+              <a:rPr lang="en-US" dirty="0" err="1" smtClean="0"/>
+              <a:t>checkin</a:t>
+            </a:r>
+            <a:endParaRPr lang="en-US" dirty="0" smtClean="0"/>
+          </a:p>
+          <a:p>
+            <a:endParaRPr lang="en-US" dirty="0" smtClean="0"/>
+          </a:p>
+          <a:p>
+            <a:r>
+              <a:rPr lang="en-US" dirty="0" smtClean="0"/>
+              <a:t>Global Variables however, are resolved at runtime.</a:t>
+            </a:r>
+          </a:p>
+          <a:p>
+            <a:endParaRPr lang="en-US" dirty="0" smtClean="0"/>
+          </a:p>
+          <a:p>
+            <a:r>
+              <a:rPr lang="en-US" dirty="0" smtClean="0"/>
+              <a:t>Internally, scripts in the </a:t>
+            </a:r>
+            <a:r>
+              <a:rPr lang="en-US" dirty="0" err="1" smtClean="0"/>
+              <a:t>vars</a:t>
+            </a:r>
+            <a:r>
+              <a:rPr lang="en-US" dirty="0" smtClean="0"/>
+              <a:t> directory are instantiated on-demand as singletons. This allows multiple methods or properties to be defined in a single .groovy file which interact with each other</a:t>
+            </a:r>
+          </a:p>
+          <a:p>
+            <a:endParaRPr lang="en-US" dirty="0" smtClean="0"/>
+          </a:p>
+          <a:p>
+            <a:r>
+              <a:rPr lang="en-US" dirty="0" smtClean="0"/>
+              <a:t>5) It</a:t>
+            </a:r>
+            <a:r>
+              <a:rPr lang="en-US" baseline="0" dirty="0" smtClean="0"/>
+              <a:t> feels to me that when you write global functions is like abstracting some common usage in existing pipelines, and code in the class libraries is more like new functionality. But it might be just me. The code in Global functions could look like declarative pipelines where class reassemble more like java code.</a:t>
+            </a:r>
+            <a:endParaRPr lang="en-US" dirty="0" smtClean="0"/>
+          </a:p>
+          <a:p>
+            <a:endParaRPr lang="en-US" dirty="0" smtClean="0"/>
+          </a:p>
+          <a:p>
+            <a:endParaRPr lang="en-US" dirty="0" smtClean="0"/>
+          </a:p>
+          <a:p>
+            <a:endParaRPr lang="en-US" dirty="0" smtClean="0"/>
+          </a:p>
+          <a:p>
+            <a:endParaRPr lang="en-US" dirty="0" smtClean="0"/>
+          </a:p>
+          <a:p>
+            <a:endParaRPr lang="en-US" dirty="0"/>
+          </a:p>
+        </p:txBody>
+      </p:sp>
+      <p:sp>
+        <p:nvSpPr>
+          <p:cNvPr id="4" name="Slide Number Placeholder 3"/>
+          <p:cNvSpPr>
+            <a:spLocks noGrp="1"/>
+          </p:cNvSpPr>
+          <p:nvPr>
+            <p:ph type="sldNum" sz="quarter" idx="10"/>
+          </p:nvPr>
+        </p:nvSpPr>
+        <p:spPr/>
+        <p:txBody>
+          <a:bodyPr/>
+          <a:lstStyle/>
+          <a:p>
+            <a:fld id="{FCA57A33-9D30-664B-8074-27A1C6B8A605}" type="slidenum">
+              <a:rPr lang="en-US" smtClean="0"/>
+              <a:t>7</a:t>
+            </a:fld>
+            <a:endParaRPr lang="en-US"/>
+          </a:p>
+        </p:txBody>
+      </p:sp>
+    </p:spTree>
+    <p:extLst>
+      <p:ext uri="{BB962C8B-B14F-4D97-AF65-F5344CB8AC3E}">
+        <p14:creationId xmlns:p14="http://schemas.microsoft.com/office/powerpoint/2010/main" val="1778674982"/>
+      </p:ext>
+    </p:extLst>
+  </p:cSld>
+  <p:clrMapOvr>
+    <a:masterClrMapping/>
+  </p:clrMapOvr>
+</p:notes>
+</file>
+
+<file path=ppt/notesSlides/notesSlide8.xml><?xml version="1.0" encoding="utf-8"?>
+<p:notes xmlns:a="http://schemas.openxmlformats.org/drawingml/2006/main" xmlns:r="http://schemas.openxmlformats.org/officeDocument/2006/relationships" xmlns:p="http://schemas.openxmlformats.org/presentationml/2006/main">
+  <p:cSld>
+    <p:spTree>
+      <p:nvGrpSpPr>
+        <p:cNvPr id="1" name=""/>
+        <p:cNvGrpSpPr/>
+        <p:nvPr/>
+      </p:nvGrpSpPr>
+      <p:grpSpPr>
+        <a:xfrm>
+          <a:off x="0" y="0"/>
+          <a:ext cx="0" cy="0"/>
+          <a:chOff x="0" y="0"/>
+          <a:chExt cx="0" cy="0"/>
+        </a:xfrm>
+      </p:grpSpPr>
+      <p:sp>
+        <p:nvSpPr>
+          <p:cNvPr id="2" name="Slide Image Placeholder 1"/>
+          <p:cNvSpPr>
+            <a:spLocks noGrp="1" noRot="1" noChangeAspect="1"/>
+          </p:cNvSpPr>
+          <p:nvPr>
+            <p:ph type="sldImg"/>
+          </p:nvPr>
+        </p:nvSpPr>
+        <p:spPr/>
+      </p:sp>
+      <p:sp>
+        <p:nvSpPr>
+          <p:cNvPr id="3" name="Notes Placeholder 2"/>
+          <p:cNvSpPr>
+            <a:spLocks noGrp="1"/>
+          </p:cNvSpPr>
+          <p:nvPr>
+            <p:ph type="body" idx="1"/>
+          </p:nvPr>
+        </p:nvSpPr>
+        <p:spPr/>
+        <p:txBody>
+          <a:bodyPr/>
+          <a:lstStyle/>
+          <a:p>
+            <a:r>
+              <a:rPr lang="en-US" dirty="0" smtClean="0"/>
+              <a:t>So how</a:t>
+            </a:r>
+            <a:r>
+              <a:rPr lang="en-US" baseline="0" dirty="0" smtClean="0"/>
+              <a:t> to access it </a:t>
+            </a:r>
+          </a:p>
+          <a:p>
+            <a:endParaRPr lang="en-US" baseline="0" dirty="0" smtClean="0"/>
+          </a:p>
+          <a:p>
+            <a:r>
+              <a:rPr lang="en-US" dirty="0" smtClean="0"/>
+              <a:t>@Library('my-shared-library') _</a:t>
+            </a:r>
+          </a:p>
+          <a:p>
+            <a:r>
+              <a:rPr lang="en-US" dirty="0" smtClean="0"/>
+              <a:t>/* Using a version </a:t>
+            </a:r>
+            <a:r>
+              <a:rPr lang="en-US" dirty="0" err="1" smtClean="0"/>
+              <a:t>specifier</a:t>
+            </a:r>
+            <a:r>
+              <a:rPr lang="en-US" dirty="0" smtClean="0"/>
+              <a:t>, such as branch, tag, </a:t>
+            </a:r>
+            <a:r>
+              <a:rPr lang="en-US" dirty="0" err="1" smtClean="0"/>
+              <a:t>etc</a:t>
+            </a:r>
+            <a:r>
+              <a:rPr lang="en-US" dirty="0" smtClean="0"/>
+              <a:t> */</a:t>
+            </a:r>
+          </a:p>
+          <a:p>
+            <a:r>
+              <a:rPr lang="en-US" dirty="0" smtClean="0"/>
+              <a:t>@Library('my-shared-library@1.0') _</a:t>
+            </a:r>
+          </a:p>
+          <a:p>
+            <a:r>
+              <a:rPr lang="en-US" dirty="0" smtClean="0"/>
+              <a:t>/* Accessing multiple libraries with one statement */</a:t>
+            </a:r>
+          </a:p>
+          <a:p>
+            <a:r>
+              <a:rPr lang="en-US" dirty="0" smtClean="0"/>
+              <a:t>@Library(['my-shared-library', 'otherlib@abc1234']) _</a:t>
+            </a:r>
+          </a:p>
+          <a:p>
+            <a:endParaRPr lang="en-US" dirty="0" smtClean="0"/>
+          </a:p>
+          <a:p>
+            <a:endParaRPr lang="en-US" dirty="0" smtClean="0"/>
+          </a:p>
+          <a:p>
+            <a:r>
+              <a:rPr lang="en-US" dirty="0" smtClean="0"/>
+              <a:t>When referring to class libraries (with </a:t>
+            </a:r>
+            <a:r>
+              <a:rPr lang="en-US" dirty="0" err="1" smtClean="0"/>
+              <a:t>src</a:t>
+            </a:r>
+            <a:r>
+              <a:rPr lang="en-US" dirty="0" smtClean="0"/>
+              <a:t>/ directories), conventionally the annotation goes on an import statement:</a:t>
+            </a:r>
+          </a:p>
+          <a:p>
+            <a:endParaRPr lang="en-US" dirty="0" smtClean="0"/>
+          </a:p>
+          <a:p>
+            <a:r>
+              <a:rPr lang="en-US" dirty="0" smtClean="0"/>
+              <a:t>@Library('</a:t>
+            </a:r>
+            <a:r>
+              <a:rPr lang="en-US" dirty="0" err="1" smtClean="0"/>
+              <a:t>somelib</a:t>
+            </a:r>
+            <a:r>
+              <a:rPr lang="en-US" dirty="0" smtClean="0"/>
+              <a:t>')</a:t>
+            </a:r>
+          </a:p>
+          <a:p>
+            <a:r>
+              <a:rPr lang="en-US" dirty="0" smtClean="0"/>
+              <a:t>import </a:t>
+            </a:r>
+            <a:r>
+              <a:rPr lang="en-US" dirty="0" err="1" smtClean="0"/>
+              <a:t>com.mycorp.pipeline.somelib.UsefulClass</a:t>
+            </a:r>
+            <a:endParaRPr lang="en-US" dirty="0" smtClean="0"/>
+          </a:p>
+          <a:p>
+            <a:endParaRPr lang="en-US" dirty="0" smtClean="0"/>
+          </a:p>
+          <a:p>
+            <a:endParaRPr lang="en-US" dirty="0" smtClean="0"/>
+          </a:p>
+          <a:p>
+            <a:r>
+              <a:rPr lang="en-US" dirty="0" smtClean="0"/>
+              <a:t>For Shared Libraries which only define Global Variables (</a:t>
+            </a:r>
+            <a:r>
+              <a:rPr lang="en-US" dirty="0" err="1" smtClean="0"/>
+              <a:t>vars</a:t>
+            </a:r>
+            <a:r>
+              <a:rPr lang="en-US" dirty="0" smtClean="0"/>
+              <a:t>/), or a </a:t>
+            </a:r>
+            <a:r>
+              <a:rPr lang="en-US" dirty="0" err="1" smtClean="0"/>
+              <a:t>Jenkinsfile</a:t>
+            </a:r>
+            <a:r>
+              <a:rPr lang="en-US" dirty="0" smtClean="0"/>
+              <a:t> which only needs a Global Variable, the annotation pattern @Library('my-shared-library') _ may be useful for keeping code concise. In essence, instead of annotating an unnecessary import statement, the symbol _ is annotated.</a:t>
+            </a:r>
+          </a:p>
+          <a:p>
+            <a:endParaRPr lang="en-US" dirty="0" smtClean="0"/>
+          </a:p>
+          <a:p>
+            <a:r>
+              <a:rPr lang="en-US" dirty="0" smtClean="0"/>
+              <a:t>It is not recommended to import a global variable/function, since this will force the compiler to interpret fields and methods as static even if they were intended to be instance. The Groovy compiler in this case can produce confusing error messages.</a:t>
+            </a:r>
+          </a:p>
+          <a:p>
+            <a:endParaRPr lang="en-US" dirty="0" smtClean="0"/>
+          </a:p>
+        </p:txBody>
+      </p:sp>
+      <p:sp>
+        <p:nvSpPr>
+          <p:cNvPr id="4" name="Slide Number Placeholder 3"/>
+          <p:cNvSpPr>
+            <a:spLocks noGrp="1"/>
+          </p:cNvSpPr>
+          <p:nvPr>
+            <p:ph type="sldNum" sz="quarter" idx="10"/>
+          </p:nvPr>
+        </p:nvSpPr>
+        <p:spPr/>
+        <p:txBody>
+          <a:bodyPr/>
+          <a:lstStyle/>
+          <a:p>
+            <a:fld id="{FCA57A33-9D30-664B-8074-27A1C6B8A605}" type="slidenum">
+              <a:rPr lang="en-US" smtClean="0"/>
+              <a:t>8</a:t>
+            </a:fld>
+            <a:endParaRPr lang="en-US"/>
+          </a:p>
+        </p:txBody>
+      </p:sp>
+    </p:spTree>
+    <p:extLst>
+      <p:ext uri="{BB962C8B-B14F-4D97-AF65-F5344CB8AC3E}">
+        <p14:creationId xmlns:p14="http://schemas.microsoft.com/office/powerpoint/2010/main" val="524841744"/>
+      </p:ext>
+    </p:extLst>
+  </p:cSld>
+  <p:clrMapOvr>
+    <a:masterClrMapping/>
+  </p:clrMapOvr>
+</p:notes>
+</file>
+
+<file path=ppt/notesSlides/notesSlide9.xml><?xml version="1.0" encoding="utf-8"?>
+<p:notes xmlns:a="http://schemas.openxmlformats.org/drawingml/2006/main" xmlns:r="http://schemas.openxmlformats.org/officeDocument/2006/relationships" xmlns:p="http://schemas.openxmlformats.org/presentationml/2006/main">
+  <p:cSld>
+    <p:spTree>
+      <p:nvGrpSpPr>
+        <p:cNvPr id="1" name=""/>
+        <p:cNvGrpSpPr/>
+        <p:nvPr/>
+      </p:nvGrpSpPr>
+      <p:grpSpPr>
+        <a:xfrm>
+          <a:off x="0" y="0"/>
+          <a:ext cx="0" cy="0"/>
+          <a:chOff x="0" y="0"/>
+          <a:chExt cx="0" cy="0"/>
+        </a:xfrm>
+      </p:grpSpPr>
+      <p:sp>
+        <p:nvSpPr>
+          <p:cNvPr id="2" name="Slide Image Placeholder 1"/>
+          <p:cNvSpPr>
+            <a:spLocks noGrp="1" noRot="1" noChangeAspect="1"/>
+          </p:cNvSpPr>
+          <p:nvPr>
+            <p:ph type="sldImg"/>
+          </p:nvPr>
+        </p:nvSpPr>
+        <p:spPr/>
+      </p:sp>
+      <p:sp>
+        <p:nvSpPr>
+          <p:cNvPr id="3" name="Notes Placeholder 2"/>
+          <p:cNvSpPr>
+            <a:spLocks noGrp="1"/>
+          </p:cNvSpPr>
+          <p:nvPr>
+            <p:ph type="body" idx="1"/>
+          </p:nvPr>
+        </p:nvSpPr>
+        <p:spPr/>
+        <p:txBody>
+          <a:bodyPr/>
+          <a:lstStyle/>
+          <a:p>
+            <a:pPr marL="0" marR="0" indent="0" algn="l" defTabSz="457200" rtl="0" eaLnBrk="1" fontAlgn="auto" latinLnBrk="0" hangingPunct="1">
+              <a:lnSpc>
+                <a:spcPct val="100000"/>
+              </a:lnSpc>
+              <a:spcBef>
+                <a:spcPts val="0"/>
+              </a:spcBef>
+              <a:spcAft>
+                <a:spcPts val="0"/>
+              </a:spcAft>
+              <a:buClrTx/>
+              <a:buSzTx/>
+              <a:buFontTx/>
+              <a:buNone/>
+              <a:tabLst/>
+              <a:defRPr/>
+            </a:pPr>
+            <a:r>
+              <a:rPr lang="en-US" dirty="0" smtClean="0"/>
+              <a:t>Concrete</a:t>
+            </a:r>
+            <a:r>
+              <a:rPr lang="en-US" baseline="0" dirty="0" smtClean="0"/>
+              <a:t> examples </a:t>
+            </a:r>
+            <a:r>
+              <a:rPr lang="en-US" dirty="0" smtClean="0"/>
+              <a:t>could</a:t>
+            </a:r>
+            <a:r>
+              <a:rPr lang="en-US" baseline="0" dirty="0" smtClean="0"/>
+              <a:t> be something that runs a sonar build PR</a:t>
+            </a:r>
+          </a:p>
+          <a:p>
+            <a:pPr marL="0" marR="0" indent="0" algn="l" defTabSz="457200" rtl="0" eaLnBrk="1" fontAlgn="auto" latinLnBrk="0" hangingPunct="1">
+              <a:lnSpc>
+                <a:spcPct val="100000"/>
+              </a:lnSpc>
+              <a:spcBef>
+                <a:spcPts val="0"/>
+              </a:spcBef>
+              <a:spcAft>
+                <a:spcPts val="0"/>
+              </a:spcAft>
+              <a:buClrTx/>
+              <a:buSzTx/>
+              <a:buFontTx/>
+              <a:buNone/>
+              <a:tabLst/>
+              <a:defRPr/>
+            </a:pPr>
+            <a:r>
+              <a:rPr lang="en-US" baseline="0" dirty="0" smtClean="0"/>
+              <a:t>On as a global </a:t>
+            </a:r>
+            <a:r>
+              <a:rPr lang="en-US" baseline="0" dirty="0" err="1" smtClean="0"/>
+              <a:t>varaible</a:t>
+            </a:r>
+            <a:r>
+              <a:rPr lang="en-US" baseline="0" dirty="0" smtClean="0"/>
+              <a:t> </a:t>
+            </a:r>
+          </a:p>
+          <a:p>
+            <a:pPr marL="0" marR="0" indent="0" algn="l" defTabSz="457200" rtl="0" eaLnBrk="1" fontAlgn="auto" latinLnBrk="0" hangingPunct="1">
+              <a:lnSpc>
+                <a:spcPct val="100000"/>
+              </a:lnSpc>
+              <a:spcBef>
+                <a:spcPts val="0"/>
+              </a:spcBef>
+              <a:spcAft>
+                <a:spcPts val="0"/>
+              </a:spcAft>
+              <a:buClrTx/>
+              <a:buSzTx/>
+              <a:buFontTx/>
+              <a:buNone/>
+              <a:tabLst/>
+              <a:defRPr/>
+            </a:pPr>
+            <a:r>
+              <a:rPr lang="en-US" baseline="0" dirty="0" smtClean="0"/>
+              <a:t>One as class</a:t>
+            </a:r>
+          </a:p>
+          <a:p>
+            <a:pPr marL="0" marR="0" indent="0" algn="l" defTabSz="457200" rtl="0" eaLnBrk="1" fontAlgn="auto" latinLnBrk="0" hangingPunct="1">
+              <a:lnSpc>
+                <a:spcPct val="100000"/>
+              </a:lnSpc>
+              <a:spcBef>
+                <a:spcPts val="0"/>
+              </a:spcBef>
+              <a:spcAft>
+                <a:spcPts val="0"/>
+              </a:spcAft>
+              <a:buClrTx/>
+              <a:buSzTx/>
+              <a:buFontTx/>
+              <a:buNone/>
+              <a:tabLst/>
+              <a:defRPr/>
+            </a:pPr>
+            <a:r>
+              <a:rPr lang="en-US" baseline="0" dirty="0" smtClean="0"/>
+              <a:t>One as a step</a:t>
+            </a:r>
+            <a:endParaRPr lang="en-US" dirty="0" smtClean="0"/>
+          </a:p>
+          <a:p>
+            <a:endParaRPr lang="en-US" dirty="0" smtClean="0"/>
+          </a:p>
+          <a:p>
+            <a:r>
+              <a:rPr lang="en-US" dirty="0" smtClean="0"/>
+              <a:t>Built in </a:t>
+            </a:r>
+            <a:r>
+              <a:rPr lang="en-US" dirty="0" err="1" smtClean="0"/>
+              <a:t>acepting</a:t>
+            </a:r>
+            <a:r>
+              <a:rPr lang="en-US" baseline="0" dirty="0" smtClean="0"/>
+              <a:t> a </a:t>
+            </a:r>
+            <a:r>
+              <a:rPr lang="en-US" baseline="0" dirty="0" err="1" smtClean="0"/>
+              <a:t>strin</a:t>
+            </a:r>
+            <a:r>
+              <a:rPr lang="en-US" baseline="0" dirty="0" smtClean="0"/>
+              <a:t> </a:t>
+            </a:r>
+            <a:r>
+              <a:rPr lang="en-US" baseline="0" dirty="0" err="1" smtClean="0"/>
+              <a:t>i.e</a:t>
+            </a:r>
+            <a:r>
+              <a:rPr lang="en-US" baseline="0" dirty="0" smtClean="0"/>
+              <a:t> shell’’  </a:t>
+            </a:r>
+            <a:r>
+              <a:rPr lang="en-US" baseline="0" dirty="0" err="1" smtClean="0"/>
+              <a:t>git</a:t>
+            </a:r>
+            <a:r>
+              <a:rPr lang="en-US" baseline="0" dirty="0" smtClean="0"/>
+              <a:t> ‘’</a:t>
+            </a:r>
+          </a:p>
+          <a:p>
+            <a:r>
+              <a:rPr lang="en-US" baseline="0" dirty="0" smtClean="0"/>
+              <a:t>Build in </a:t>
+            </a:r>
+            <a:r>
+              <a:rPr lang="en-US" baseline="0" dirty="0" err="1" smtClean="0"/>
+              <a:t>aceptiing</a:t>
+            </a:r>
+            <a:r>
+              <a:rPr lang="en-US" baseline="0" dirty="0" smtClean="0"/>
+              <a:t> a block </a:t>
+            </a:r>
+            <a:r>
+              <a:rPr lang="en-US" baseline="0" dirty="0" err="1" smtClean="0"/>
+              <a:t>i.e</a:t>
+            </a:r>
+            <a:r>
+              <a:rPr lang="en-US" baseline="0" dirty="0" smtClean="0"/>
+              <a:t> node{} script {}</a:t>
+            </a:r>
+          </a:p>
+          <a:p>
+            <a:endParaRPr lang="en-US" baseline="0" dirty="0" smtClean="0"/>
+          </a:p>
+          <a:p>
+            <a:r>
+              <a:rPr lang="en-US" smtClean="0"/>
+              <a:t>Defining a more structured DSL</a:t>
+            </a:r>
+          </a:p>
+          <a:p>
+            <a:endParaRPr lang="en-US" dirty="0"/>
+          </a:p>
+        </p:txBody>
+      </p:sp>
+      <p:sp>
+        <p:nvSpPr>
+          <p:cNvPr id="4" name="Slide Number Placeholder 3"/>
+          <p:cNvSpPr>
+            <a:spLocks noGrp="1"/>
+          </p:cNvSpPr>
+          <p:nvPr>
+            <p:ph type="sldNum" sz="quarter" idx="10"/>
+          </p:nvPr>
+        </p:nvSpPr>
+        <p:spPr/>
+        <p:txBody>
+          <a:bodyPr/>
+          <a:lstStyle/>
+          <a:p>
+            <a:fld id="{FCA57A33-9D30-664B-8074-27A1C6B8A605}" type="slidenum">
+              <a:rPr lang="en-US" smtClean="0"/>
+              <a:t>9</a:t>
+            </a:fld>
+            <a:endParaRPr lang="en-US"/>
+          </a:p>
+        </p:txBody>
+      </p:sp>
+    </p:spTree>
+    <p:extLst>
+      <p:ext uri="{BB962C8B-B14F-4D97-AF65-F5344CB8AC3E}">
+        <p14:creationId xmlns:p14="http://schemas.microsoft.com/office/powerpoint/2010/main" val="552507117"/>
       </p:ext>
     </p:extLst>
   </p:cSld>
@@ -4879,6 +6453,509 @@
 </p:sld>
 </file>
 
+<file path=ppt/slides/slide10.xml><?xml version="1.0" encoding="utf-8"?>
+<p:sld xmlns:a="http://schemas.openxmlformats.org/drawingml/2006/main" xmlns:r="http://schemas.openxmlformats.org/officeDocument/2006/relationships" xmlns:p="http://schemas.openxmlformats.org/presentationml/2006/main">
+  <p:cSld>
+    <p:spTree>
+      <p:nvGrpSpPr>
+        <p:cNvPr id="1" name=""/>
+        <p:cNvGrpSpPr/>
+        <p:nvPr/>
+      </p:nvGrpSpPr>
+      <p:grpSpPr>
+        <a:xfrm>
+          <a:off x="0" y="0"/>
+          <a:ext cx="0" cy="0"/>
+          <a:chOff x="0" y="0"/>
+          <a:chExt cx="0" cy="0"/>
+        </a:xfrm>
+      </p:grpSpPr>
+      <p:sp>
+        <p:nvSpPr>
+          <p:cNvPr id="2" name="Title 1"/>
+          <p:cNvSpPr>
+            <a:spLocks noGrp="1"/>
+          </p:cNvSpPr>
+          <p:nvPr>
+            <p:ph type="title"/>
+          </p:nvPr>
+        </p:nvSpPr>
+        <p:spPr/>
+        <p:txBody>
+          <a:bodyPr/>
+          <a:lstStyle/>
+          <a:p>
+            <a:endParaRPr lang="en-US" dirty="0"/>
+          </a:p>
+        </p:txBody>
+      </p:sp>
+      <p:pic>
+        <p:nvPicPr>
+          <p:cNvPr id="5" name="Content Placeholder 4" descr="kaboom.jpg"/>
+          <p:cNvPicPr>
+            <a:picLocks noGrp="1" noChangeAspect="1"/>
+          </p:cNvPicPr>
+          <p:nvPr>
+            <p:ph idx="1"/>
+          </p:nvPr>
+        </p:nvPicPr>
+        <p:blipFill>
+          <a:blip r:embed="rId3">
+            <a:extLst>
+              <a:ext uri="{28A0092B-C50C-407E-A947-70E740481C1C}">
+                <a14:useLocalDpi xmlns:a14="http://schemas.microsoft.com/office/drawing/2010/main" val="0"/>
+              </a:ext>
+            </a:extLst>
+          </a:blip>
+          <a:srcRect l="3772" r="3772"/>
+          <a:stretch>
+            <a:fillRect/>
+          </a:stretch>
+        </p:blipFill>
+        <p:spPr/>
+      </p:pic>
+    </p:spTree>
+    <p:extLst>
+      <p:ext uri="{BB962C8B-B14F-4D97-AF65-F5344CB8AC3E}">
+        <p14:creationId xmlns:p14="http://schemas.microsoft.com/office/powerpoint/2010/main" val="1379485343"/>
+      </p:ext>
+    </p:extLst>
+  </p:cSld>
+  <p:clrMapOvr>
+    <a:masterClrMapping/>
+  </p:clrMapOvr>
+</p:sld>
+</file>
+
+<file path=ppt/slides/slide11.xml><?xml version="1.0" encoding="utf-8"?>
+<p:sld xmlns:a="http://schemas.openxmlformats.org/drawingml/2006/main" xmlns:r="http://schemas.openxmlformats.org/officeDocument/2006/relationships" xmlns:p="http://schemas.openxmlformats.org/presentationml/2006/main">
+  <p:cSld>
+    <p:spTree>
+      <p:nvGrpSpPr>
+        <p:cNvPr id="1" name=""/>
+        <p:cNvGrpSpPr/>
+        <p:nvPr/>
+      </p:nvGrpSpPr>
+      <p:grpSpPr>
+        <a:xfrm>
+          <a:off x="0" y="0"/>
+          <a:ext cx="0" cy="0"/>
+          <a:chOff x="0" y="0"/>
+          <a:chExt cx="0" cy="0"/>
+        </a:xfrm>
+      </p:grpSpPr>
+      <p:sp>
+        <p:nvSpPr>
+          <p:cNvPr id="2" name="Title 1"/>
+          <p:cNvSpPr>
+            <a:spLocks noGrp="1"/>
+          </p:cNvSpPr>
+          <p:nvPr>
+            <p:ph type="title"/>
+          </p:nvPr>
+        </p:nvSpPr>
+        <p:spPr/>
+        <p:txBody>
+          <a:bodyPr/>
+          <a:lstStyle/>
+          <a:p>
+            <a:r>
+              <a:rPr lang="en-US" dirty="0" smtClean="0"/>
+              <a:t>Modification Workflow</a:t>
+            </a:r>
+            <a:endParaRPr lang="en-US" dirty="0"/>
+          </a:p>
+        </p:txBody>
+      </p:sp>
+      <p:sp>
+        <p:nvSpPr>
+          <p:cNvPr id="3" name="Content Placeholder 2"/>
+          <p:cNvSpPr>
+            <a:spLocks noGrp="1"/>
+          </p:cNvSpPr>
+          <p:nvPr>
+            <p:ph idx="1"/>
+          </p:nvPr>
+        </p:nvSpPr>
+        <p:spPr/>
+        <p:txBody>
+          <a:bodyPr/>
+          <a:lstStyle/>
+          <a:p>
+            <a:r>
+              <a:rPr lang="en-US" dirty="0" smtClean="0"/>
+              <a:t>Create a branch of you pipeline</a:t>
+            </a:r>
+          </a:p>
+          <a:p>
+            <a:r>
+              <a:rPr lang="en-US" dirty="0" smtClean="0"/>
+              <a:t>Access you modification with @</a:t>
+            </a:r>
+            <a:r>
+              <a:rPr lang="en-US" dirty="0" err="1" smtClean="0"/>
+              <a:t>branchname</a:t>
+            </a:r>
+            <a:endParaRPr lang="en-US" dirty="0" smtClean="0"/>
+          </a:p>
+          <a:p>
+            <a:r>
+              <a:rPr lang="en-US" dirty="0" smtClean="0"/>
+              <a:t>Submit pull request.</a:t>
+            </a:r>
+          </a:p>
+          <a:p>
+            <a:r>
+              <a:rPr lang="en-US" dirty="0" smtClean="0"/>
+              <a:t>Get approval.</a:t>
+            </a:r>
+          </a:p>
+          <a:p>
+            <a:r>
+              <a:rPr lang="en-US" dirty="0" smtClean="0"/>
+              <a:t>Merge to master.</a:t>
+            </a:r>
+            <a:endParaRPr lang="en-US" dirty="0"/>
+          </a:p>
+        </p:txBody>
+      </p:sp>
+    </p:spTree>
+    <p:extLst>
+      <p:ext uri="{BB962C8B-B14F-4D97-AF65-F5344CB8AC3E}">
+        <p14:creationId xmlns:p14="http://schemas.microsoft.com/office/powerpoint/2010/main" val="657038025"/>
+      </p:ext>
+    </p:extLst>
+  </p:cSld>
+  <p:clrMapOvr>
+    <a:masterClrMapping/>
+  </p:clrMapOvr>
+</p:sld>
+</file>
+
+<file path=ppt/slides/slide12.xml><?xml version="1.0" encoding="utf-8"?>
+<p:sld xmlns:a="http://schemas.openxmlformats.org/drawingml/2006/main" xmlns:r="http://schemas.openxmlformats.org/officeDocument/2006/relationships" xmlns:p="http://schemas.openxmlformats.org/presentationml/2006/main">
+  <p:cSld>
+    <p:spTree>
+      <p:nvGrpSpPr>
+        <p:cNvPr id="1" name=""/>
+        <p:cNvGrpSpPr/>
+        <p:nvPr/>
+      </p:nvGrpSpPr>
+      <p:grpSpPr>
+        <a:xfrm>
+          <a:off x="0" y="0"/>
+          <a:ext cx="0" cy="0"/>
+          <a:chOff x="0" y="0"/>
+          <a:chExt cx="0" cy="0"/>
+        </a:xfrm>
+      </p:grpSpPr>
+      <p:sp>
+        <p:nvSpPr>
+          <p:cNvPr id="2" name="Title 1"/>
+          <p:cNvSpPr>
+            <a:spLocks noGrp="1"/>
+          </p:cNvSpPr>
+          <p:nvPr>
+            <p:ph type="title"/>
+          </p:nvPr>
+        </p:nvSpPr>
+        <p:spPr/>
+        <p:txBody>
+          <a:bodyPr/>
+          <a:lstStyle/>
+          <a:p>
+            <a:r>
+              <a:rPr lang="en-US" dirty="0" smtClean="0"/>
+              <a:t>DONTS</a:t>
+            </a:r>
+            <a:endParaRPr lang="en-US" dirty="0"/>
+          </a:p>
+        </p:txBody>
+      </p:sp>
+      <p:sp>
+        <p:nvSpPr>
+          <p:cNvPr id="3" name="Content Placeholder 2"/>
+          <p:cNvSpPr>
+            <a:spLocks noGrp="1"/>
+          </p:cNvSpPr>
+          <p:nvPr>
+            <p:ph idx="1"/>
+          </p:nvPr>
+        </p:nvSpPr>
+        <p:spPr/>
+        <p:txBody>
+          <a:bodyPr/>
+          <a:lstStyle/>
+          <a:p>
+            <a:r>
+              <a:rPr lang="en-US" dirty="0" smtClean="0"/>
+              <a:t>Do not import global variables</a:t>
+            </a:r>
+          </a:p>
+          <a:p>
+            <a:pPr lvl="1"/>
+            <a:r>
+              <a:rPr lang="en-US" dirty="0"/>
+              <a:t>If you </a:t>
+            </a:r>
+            <a:r>
+              <a:rPr lang="en-US" dirty="0" smtClean="0"/>
+              <a:t>do variables/functions became static</a:t>
+            </a:r>
+          </a:p>
+          <a:p>
+            <a:r>
+              <a:rPr lang="en-US" dirty="0" smtClean="0"/>
+              <a:t>Allow direct commits to master (modification of pipelines thru branches/PR)</a:t>
+            </a:r>
+            <a:endParaRPr lang="en-US" dirty="0"/>
+          </a:p>
+        </p:txBody>
+      </p:sp>
+    </p:spTree>
+    <p:extLst>
+      <p:ext uri="{BB962C8B-B14F-4D97-AF65-F5344CB8AC3E}">
+        <p14:creationId xmlns:p14="http://schemas.microsoft.com/office/powerpoint/2010/main" val="3487218714"/>
+      </p:ext>
+    </p:extLst>
+  </p:cSld>
+  <p:clrMapOvr>
+    <a:masterClrMapping/>
+  </p:clrMapOvr>
+</p:sld>
+</file>
+
+<file path=ppt/slides/slide13.xml><?xml version="1.0" encoding="utf-8"?>
+<p:sld xmlns:a="http://schemas.openxmlformats.org/drawingml/2006/main" xmlns:r="http://schemas.openxmlformats.org/officeDocument/2006/relationships" xmlns:p="http://schemas.openxmlformats.org/presentationml/2006/main">
+  <p:cSld>
+    <p:spTree>
+      <p:nvGrpSpPr>
+        <p:cNvPr id="1" name=""/>
+        <p:cNvGrpSpPr/>
+        <p:nvPr/>
+      </p:nvGrpSpPr>
+      <p:grpSpPr>
+        <a:xfrm>
+          <a:off x="0" y="0"/>
+          <a:ext cx="0" cy="0"/>
+          <a:chOff x="0" y="0"/>
+          <a:chExt cx="0" cy="0"/>
+        </a:xfrm>
+      </p:grpSpPr>
+      <p:sp>
+        <p:nvSpPr>
+          <p:cNvPr id="2" name="Title 1"/>
+          <p:cNvSpPr>
+            <a:spLocks noGrp="1"/>
+          </p:cNvSpPr>
+          <p:nvPr>
+            <p:ph type="title"/>
+          </p:nvPr>
+        </p:nvSpPr>
+        <p:spPr/>
+        <p:txBody>
+          <a:bodyPr/>
+          <a:lstStyle/>
+          <a:p>
+            <a:r>
+              <a:rPr lang="en-US" dirty="0" smtClean="0"/>
+              <a:t>Documentation</a:t>
+            </a:r>
+            <a:endParaRPr lang="en-US" dirty="0"/>
+          </a:p>
+        </p:txBody>
+      </p:sp>
+      <p:sp>
+        <p:nvSpPr>
+          <p:cNvPr id="3" name="Content Placeholder 2"/>
+          <p:cNvSpPr>
+            <a:spLocks noGrp="1"/>
+          </p:cNvSpPr>
+          <p:nvPr>
+            <p:ph idx="1"/>
+          </p:nvPr>
+        </p:nvSpPr>
+        <p:spPr/>
+        <p:txBody>
+          <a:bodyPr/>
+          <a:lstStyle/>
+          <a:p>
+            <a:endParaRPr lang="en-US"/>
+          </a:p>
+        </p:txBody>
+      </p:sp>
+    </p:spTree>
+    <p:extLst>
+      <p:ext uri="{BB962C8B-B14F-4D97-AF65-F5344CB8AC3E}">
+        <p14:creationId xmlns:p14="http://schemas.microsoft.com/office/powerpoint/2010/main" val="735827430"/>
+      </p:ext>
+    </p:extLst>
+  </p:cSld>
+  <p:clrMapOvr>
+    <a:masterClrMapping/>
+  </p:clrMapOvr>
+</p:sld>
+</file>
+
+<file path=ppt/slides/slide14.xml><?xml version="1.0" encoding="utf-8"?>
+<p:sld xmlns:a="http://schemas.openxmlformats.org/drawingml/2006/main" xmlns:r="http://schemas.openxmlformats.org/officeDocument/2006/relationships" xmlns:p="http://schemas.openxmlformats.org/presentationml/2006/main">
+  <p:cSld>
+    <p:spTree>
+      <p:nvGrpSpPr>
+        <p:cNvPr id="1" name=""/>
+        <p:cNvGrpSpPr/>
+        <p:nvPr/>
+      </p:nvGrpSpPr>
+      <p:grpSpPr>
+        <a:xfrm>
+          <a:off x="0" y="0"/>
+          <a:ext cx="0" cy="0"/>
+          <a:chOff x="0" y="0"/>
+          <a:chExt cx="0" cy="0"/>
+        </a:xfrm>
+      </p:grpSpPr>
+      <p:sp>
+        <p:nvSpPr>
+          <p:cNvPr id="2" name="Title 1"/>
+          <p:cNvSpPr>
+            <a:spLocks noGrp="1"/>
+          </p:cNvSpPr>
+          <p:nvPr>
+            <p:ph type="title"/>
+          </p:nvPr>
+        </p:nvSpPr>
+        <p:spPr/>
+        <p:txBody>
+          <a:bodyPr/>
+          <a:lstStyle/>
+          <a:p>
+            <a:r>
+              <a:rPr lang="en-US" dirty="0" smtClean="0"/>
+              <a:t>Back up slides</a:t>
+            </a:r>
+            <a:endParaRPr lang="en-US" dirty="0"/>
+          </a:p>
+        </p:txBody>
+      </p:sp>
+      <p:sp>
+        <p:nvSpPr>
+          <p:cNvPr id="3" name="Content Placeholder 2"/>
+          <p:cNvSpPr>
+            <a:spLocks noGrp="1"/>
+          </p:cNvSpPr>
+          <p:nvPr>
+            <p:ph idx="1"/>
+          </p:nvPr>
+        </p:nvSpPr>
+        <p:spPr/>
+        <p:txBody>
+          <a:bodyPr/>
+          <a:lstStyle/>
+          <a:p>
+            <a:endParaRPr lang="en-US"/>
+          </a:p>
+        </p:txBody>
+      </p:sp>
+    </p:spTree>
+    <p:extLst>
+      <p:ext uri="{BB962C8B-B14F-4D97-AF65-F5344CB8AC3E}">
+        <p14:creationId xmlns:p14="http://schemas.microsoft.com/office/powerpoint/2010/main" val="137094485"/>
+      </p:ext>
+    </p:extLst>
+  </p:cSld>
+  <p:clrMapOvr>
+    <a:masterClrMapping/>
+  </p:clrMapOvr>
+</p:sld>
+</file>
+
+<file path=ppt/slides/slide15.xml><?xml version="1.0" encoding="utf-8"?>
+<p:sld xmlns:a="http://schemas.openxmlformats.org/drawingml/2006/main" xmlns:r="http://schemas.openxmlformats.org/officeDocument/2006/relationships" xmlns:p="http://schemas.openxmlformats.org/presentationml/2006/main">
+  <p:cSld>
+    <p:spTree>
+      <p:nvGrpSpPr>
+        <p:cNvPr id="1" name=""/>
+        <p:cNvGrpSpPr/>
+        <p:nvPr/>
+      </p:nvGrpSpPr>
+      <p:grpSpPr>
+        <a:xfrm>
+          <a:off x="0" y="0"/>
+          <a:ext cx="0" cy="0"/>
+          <a:chOff x="0" y="0"/>
+          <a:chExt cx="0" cy="0"/>
+        </a:xfrm>
+      </p:grpSpPr>
+      <p:sp>
+        <p:nvSpPr>
+          <p:cNvPr id="2" name="Title 1"/>
+          <p:cNvSpPr>
+            <a:spLocks noGrp="1"/>
+          </p:cNvSpPr>
+          <p:nvPr>
+            <p:ph type="title"/>
+          </p:nvPr>
+        </p:nvSpPr>
+        <p:spPr/>
+        <p:txBody>
+          <a:bodyPr/>
+          <a:lstStyle/>
+          <a:p>
+            <a:r>
+              <a:rPr lang="en-US" dirty="0" smtClean="0"/>
+              <a:t>Documentation links	</a:t>
+            </a:r>
+            <a:endParaRPr lang="en-US" dirty="0"/>
+          </a:p>
+        </p:txBody>
+      </p:sp>
+      <p:sp>
+        <p:nvSpPr>
+          <p:cNvPr id="3" name="Content Placeholder 2"/>
+          <p:cNvSpPr>
+            <a:spLocks noGrp="1"/>
+          </p:cNvSpPr>
+          <p:nvPr>
+            <p:ph idx="1"/>
+          </p:nvPr>
+        </p:nvSpPr>
+        <p:spPr/>
+        <p:txBody>
+          <a:bodyPr/>
+          <a:lstStyle/>
+          <a:p>
+            <a:r>
+              <a:rPr lang="en-US" dirty="0">
+                <a:hlinkClick r:id="rId2"/>
+              </a:rPr>
+              <a:t>https://jenkins.io/doc/book/pipeline/shared-libraries</a:t>
+            </a:r>
+            <a:r>
+              <a:rPr lang="en-US" dirty="0" smtClean="0">
+                <a:hlinkClick r:id="rId2"/>
+              </a:rPr>
+              <a:t>/</a:t>
+            </a:r>
+            <a:endParaRPr lang="en-US" dirty="0" smtClean="0"/>
+          </a:p>
+          <a:p>
+            <a:endParaRPr lang="en-US" dirty="0"/>
+          </a:p>
+        </p:txBody>
+      </p:sp>
+    </p:spTree>
+    <p:extLst>
+      <p:ext uri="{BB962C8B-B14F-4D97-AF65-F5344CB8AC3E}">
+        <p14:creationId xmlns:p14="http://schemas.microsoft.com/office/powerpoint/2010/main" val="3098079631"/>
+      </p:ext>
+    </p:extLst>
+  </p:cSld>
+  <p:clrMapOvr>
+    <a:masterClrMapping/>
+  </p:clrMapOvr>
+</p:sld>
+</file>
+
 <file path=ppt/slides/slide2.xml><?xml version="1.0" encoding="utf-8"?>
 <p:sld xmlns:a="http://schemas.openxmlformats.org/drawingml/2006/main" xmlns:r="http://schemas.openxmlformats.org/officeDocument/2006/relationships" xmlns:p="http://schemas.openxmlformats.org/presentationml/2006/main">
   <p:cSld>
@@ -4975,6 +7052,12 @@
             <a:r>
               <a:rPr lang="en-US" dirty="0" smtClean="0"/>
               <a:t> you change from </a:t>
+            </a:r>
+          </a:p>
+          <a:p>
+            <a:r>
+              <a:rPr lang="en-US" dirty="0" smtClean="0"/>
+              <a:t>Avoid monster pipelines</a:t>
             </a:r>
           </a:p>
           <a:p>
@@ -5223,6 +7306,13 @@
   <p:clrMapOvr>
     <a:masterClrMapping/>
   </p:clrMapOvr>
+  <p:timing>
+    <p:tnLst>
+      <p:par>
+        <p:cTn xmlns:p14="http://schemas.microsoft.com/office/powerpoint/2010/main" id="1" dur="indefinite" restart="never" nodeType="tmRoot"/>
+      </p:par>
+    </p:tnLst>
+  </p:timing>
 </p:sld>
 </file>
 
@@ -5266,25 +7356,28 @@
           </a:p>
         </p:txBody>
       </p:sp>
-      <p:sp>
-        <p:nvSpPr>
-          <p:cNvPr id="3" name="Content Placeholder 2"/>
-          <p:cNvSpPr>
-            <a:spLocks noGrp="1"/>
-          </p:cNvSpPr>
+      <p:pic>
+        <p:nvPicPr>
+          <p:cNvPr id="5" name="Content Placeholder 4"/>
+          <p:cNvPicPr>
+            <a:picLocks noGrp="1" noChangeAspect="1"/>
+          </p:cNvPicPr>
           <p:nvPr>
             <p:ph idx="1"/>
           </p:nvPr>
-        </p:nvSpPr>
-        <p:spPr/>
-        <p:txBody>
-          <a:bodyPr/>
-          <a:lstStyle/>
-          <a:p>
-            <a:endParaRPr lang="en-US" dirty="0"/>
-          </a:p>
-        </p:txBody>
-      </p:sp>
+        </p:nvPicPr>
+        <p:blipFill rotWithShape="1">
+          <a:blip r:embed="rId3"/>
+          <a:srcRect t="-1560" b="-174"/>
+          <a:stretch/>
+        </p:blipFill>
+        <p:spPr>
+          <a:xfrm>
+            <a:off x="457200" y="1417638"/>
+            <a:ext cx="8229600" cy="4825415"/>
+          </a:xfrm>
+        </p:spPr>
+      </p:pic>
     </p:spTree>
     <p:extLst>
       <p:ext uri="{BB962C8B-B14F-4D97-AF65-F5344CB8AC3E}">
@@ -5295,6 +7388,13 @@
   <p:clrMapOvr>
     <a:masterClrMapping/>
   </p:clrMapOvr>
+  <p:timing>
+    <p:tnLst>
+      <p:par>
+        <p:cTn xmlns:p14="http://schemas.microsoft.com/office/powerpoint/2010/main" id="1" dur="indefinite" restart="never" nodeType="tmRoot"/>
+      </p:par>
+    </p:tnLst>
+  </p:timing>
 </p:sld>
 </file>
 
@@ -5636,6 +7736,13 @@
   <p:clrMapOvr>
     <a:masterClrMapping/>
   </p:clrMapOvr>
+  <p:timing>
+    <p:tnLst>
+      <p:par>
+        <p:cTn xmlns:p14="http://schemas.microsoft.com/office/powerpoint/2010/main" id="1" dur="indefinite" restart="never" nodeType="tmRoot"/>
+      </p:par>
+    </p:tnLst>
+  </p:timing>
 </p:sld>
 </file>
 
@@ -5668,55 +7775,1454 @@
         </p:nvSpPr>
         <p:spPr/>
         <p:txBody>
-          <a:bodyPr/>
-          <a:lstStyle/>
-          <a:p>
-            <a:r>
-              <a:rPr lang="en-US" dirty="0" smtClean="0"/>
-              <a:t>Documentation links	</a:t>
+          <a:bodyPr>
+            <a:normAutofit/>
+          </a:bodyPr>
+          <a:lstStyle/>
+          <a:p>
+            <a:r>
+              <a:rPr lang="en-US" dirty="0" smtClean="0"/>
+              <a:t>Global Functions </a:t>
+            </a:r>
+            <a:r>
+              <a:rPr lang="en-US" dirty="0" err="1" smtClean="0"/>
+              <a:t>vs</a:t>
+            </a:r>
+            <a:r>
+              <a:rPr lang="en-US" dirty="0" smtClean="0"/>
+              <a:t> class libraries</a:t>
             </a:r>
             <a:endParaRPr lang="en-US" dirty="0"/>
           </a:p>
         </p:txBody>
       </p:sp>
-      <p:sp>
-        <p:nvSpPr>
-          <p:cNvPr id="3" name="Content Placeholder 2"/>
-          <p:cNvSpPr>
-            <a:spLocks noGrp="1"/>
-          </p:cNvSpPr>
+      <p:graphicFrame>
+        <p:nvGraphicFramePr>
+          <p:cNvPr id="4" name="Content Placeholder 3"/>
+          <p:cNvGraphicFramePr>
+            <a:graphicFrameLocks noGrp="1"/>
+          </p:cNvGraphicFramePr>
           <p:nvPr>
             <p:ph idx="1"/>
-          </p:nvPr>
-        </p:nvSpPr>
-        <p:spPr/>
-        <p:txBody>
-          <a:bodyPr/>
-          <a:lstStyle/>
-          <a:p>
-            <a:r>
-              <a:rPr lang="en-US" dirty="0">
-                <a:hlinkClick r:id="rId2"/>
-              </a:rPr>
-              <a:t>https://jenkins.io/doc/book/pipeline/shared-libraries</a:t>
-            </a:r>
-            <a:r>
-              <a:rPr lang="en-US" dirty="0" smtClean="0">
-                <a:hlinkClick r:id="rId2"/>
-              </a:rPr>
-              <a:t>/</a:t>
-            </a:r>
-            <a:endParaRPr lang="en-US" dirty="0" smtClean="0"/>
-          </a:p>
-          <a:p>
-            <a:endParaRPr lang="en-US" dirty="0"/>
-          </a:p>
-        </p:txBody>
-      </p:sp>
+            <p:extLst>
+              <p:ext uri="{D42A27DB-BD31-4B8C-83A1-F6EECF244321}">
+                <p14:modId xmlns:p14="http://schemas.microsoft.com/office/powerpoint/2010/main" val="686095811"/>
+              </p:ext>
+            </p:extLst>
+          </p:nvPr>
+        </p:nvGraphicFramePr>
+        <p:xfrm>
+          <a:off x="457201" y="1600200"/>
+          <a:ext cx="8088086" cy="4829396"/>
+        </p:xfrm>
+        <a:graphic>
+          <a:graphicData uri="http://schemas.openxmlformats.org/drawingml/2006/table">
+            <a:tbl>
+              <a:tblPr firstRow="1" bandRow="1">
+                <a:tableStyleId>{2D5ABB26-0587-4C30-8999-92F81FD0307C}</a:tableStyleId>
+              </a:tblPr>
+              <a:tblGrid>
+                <a:gridCol w="1641928"/>
+                <a:gridCol w="3107201"/>
+                <a:gridCol w="3338957"/>
+              </a:tblGrid>
+              <a:tr h="519300">
+                <a:tc>
+                  <a:txBody>
+                    <a:bodyPr/>
+                    <a:lstStyle/>
+                    <a:p>
+                      <a:endParaRPr lang="en-US" dirty="0"/>
+                    </a:p>
+                  </a:txBody>
+                  <a:tcPr>
+                    <a:lnL w="19050" cap="flat" cmpd="sng" algn="ctr">
+                      <a:solidFill>
+                        <a:srgbClr val="FFFFFF"/>
+                      </a:solidFill>
+                      <a:prstDash val="solid"/>
+                      <a:round/>
+                      <a:headEnd type="none" w="med" len="med"/>
+                      <a:tailEnd type="none" w="med" len="med"/>
+                    </a:lnL>
+                    <a:lnR w="19050" cap="flat" cmpd="sng" algn="ctr">
+                      <a:solidFill>
+                        <a:srgbClr val="FFFFFF"/>
+                      </a:solidFill>
+                      <a:prstDash val="solid"/>
+                      <a:round/>
+                      <a:headEnd type="none" w="med" len="med"/>
+                      <a:tailEnd type="none" w="med" len="med"/>
+                    </a:lnR>
+                    <a:lnT w="19050" cap="flat" cmpd="sng" algn="ctr">
+                      <a:solidFill>
+                        <a:srgbClr val="FFFFFF"/>
+                      </a:solidFill>
+                      <a:prstDash val="solid"/>
+                      <a:round/>
+                      <a:headEnd type="none" w="med" len="med"/>
+                      <a:tailEnd type="none" w="med" len="med"/>
+                    </a:lnT>
+                    <a:lnB w="19050" cap="flat" cmpd="sng" algn="ctr">
+                      <a:solidFill>
+                        <a:srgbClr val="FFFFFF"/>
+                      </a:solidFill>
+                      <a:prstDash val="solid"/>
+                      <a:round/>
+                      <a:headEnd type="none" w="med" len="med"/>
+                      <a:tailEnd type="none" w="med" len="med"/>
+                    </a:lnB>
+                    <a:solidFill>
+                      <a:srgbClr val="595959"/>
+                    </a:solidFill>
+                  </a:tcPr>
+                </a:tc>
+                <a:tc>
+                  <a:txBody>
+                    <a:bodyPr/>
+                    <a:lstStyle/>
+                    <a:p>
+                      <a:pPr algn="ctr"/>
+                      <a:r>
+                        <a:rPr lang="en-US" dirty="0" smtClean="0"/>
+                        <a:t>Global Variables/Functions</a:t>
+                      </a:r>
+                      <a:endParaRPr lang="en-US" dirty="0"/>
+                    </a:p>
+                  </a:txBody>
+                  <a:tcPr>
+                    <a:lnL w="19050" cap="flat" cmpd="sng" algn="ctr">
+                      <a:solidFill>
+                        <a:srgbClr val="FFFFFF"/>
+                      </a:solidFill>
+                      <a:prstDash val="solid"/>
+                      <a:round/>
+                      <a:headEnd type="none" w="med" len="med"/>
+                      <a:tailEnd type="none" w="med" len="med"/>
+                    </a:lnL>
+                    <a:lnR w="19050" cap="flat" cmpd="sng" algn="ctr">
+                      <a:solidFill>
+                        <a:srgbClr val="FFFFFF"/>
+                      </a:solidFill>
+                      <a:prstDash val="solid"/>
+                      <a:round/>
+                      <a:headEnd type="none" w="med" len="med"/>
+                      <a:tailEnd type="none" w="med" len="med"/>
+                    </a:lnR>
+                    <a:lnT w="19050" cap="flat" cmpd="sng" algn="ctr">
+                      <a:solidFill>
+                        <a:srgbClr val="FFFFFF"/>
+                      </a:solidFill>
+                      <a:prstDash val="solid"/>
+                      <a:round/>
+                      <a:headEnd type="none" w="med" len="med"/>
+                      <a:tailEnd type="none" w="med" len="med"/>
+                    </a:lnT>
+                    <a:lnB w="19050" cap="flat" cmpd="sng" algn="ctr">
+                      <a:solidFill>
+                        <a:srgbClr val="FFFFFF"/>
+                      </a:solidFill>
+                      <a:prstDash val="solid"/>
+                      <a:round/>
+                      <a:headEnd type="none" w="med" len="med"/>
+                      <a:tailEnd type="none" w="med" len="med"/>
+                    </a:lnB>
+                    <a:solidFill>
+                      <a:schemeClr val="bg1">
+                        <a:lumMod val="65000"/>
+                        <a:lumOff val="35000"/>
+                      </a:schemeClr>
+                    </a:solidFill>
+                  </a:tcPr>
+                </a:tc>
+                <a:tc>
+                  <a:txBody>
+                    <a:bodyPr/>
+                    <a:lstStyle/>
+                    <a:p>
+                      <a:pPr algn="ctr"/>
+                      <a:r>
+                        <a:rPr lang="en-US" dirty="0" smtClean="0"/>
+                        <a:t>Class</a:t>
+                      </a:r>
+                      <a:r>
+                        <a:rPr lang="en-US" baseline="0" dirty="0" smtClean="0"/>
+                        <a:t> library</a:t>
+                      </a:r>
+                      <a:endParaRPr lang="en-US" dirty="0"/>
+                    </a:p>
+                  </a:txBody>
+                  <a:tcPr>
+                    <a:lnL w="19050" cap="flat" cmpd="sng" algn="ctr">
+                      <a:solidFill>
+                        <a:srgbClr val="FFFFFF"/>
+                      </a:solidFill>
+                      <a:prstDash val="solid"/>
+                      <a:round/>
+                      <a:headEnd type="none" w="med" len="med"/>
+                      <a:tailEnd type="none" w="med" len="med"/>
+                    </a:lnL>
+                    <a:lnR w="19050" cap="flat" cmpd="sng" algn="ctr">
+                      <a:solidFill>
+                        <a:srgbClr val="FFFFFF"/>
+                      </a:solidFill>
+                      <a:prstDash val="solid"/>
+                      <a:round/>
+                      <a:headEnd type="none" w="med" len="med"/>
+                      <a:tailEnd type="none" w="med" len="med"/>
+                    </a:lnR>
+                    <a:lnT w="19050" cap="flat" cmpd="sng" algn="ctr">
+                      <a:solidFill>
+                        <a:srgbClr val="FFFFFF"/>
+                      </a:solidFill>
+                      <a:prstDash val="solid"/>
+                      <a:round/>
+                      <a:headEnd type="none" w="med" len="med"/>
+                      <a:tailEnd type="none" w="med" len="med"/>
+                    </a:lnT>
+                    <a:lnB w="19050" cap="flat" cmpd="sng" algn="ctr">
+                      <a:solidFill>
+                        <a:srgbClr val="FFFFFF"/>
+                      </a:solidFill>
+                      <a:prstDash val="solid"/>
+                      <a:round/>
+                      <a:headEnd type="none" w="med" len="med"/>
+                      <a:tailEnd type="none" w="med" len="med"/>
+                    </a:lnB>
+                    <a:solidFill>
+                      <a:schemeClr val="bg1">
+                        <a:lumMod val="65000"/>
+                        <a:lumOff val="35000"/>
+                      </a:schemeClr>
+                    </a:solidFill>
+                  </a:tcPr>
+                </a:tc>
+              </a:tr>
+              <a:tr h="541943">
+                <a:tc>
+                  <a:txBody>
+                    <a:bodyPr/>
+                    <a:lstStyle/>
+                    <a:p>
+                      <a:r>
+                        <a:rPr lang="en-US" dirty="0" err="1" smtClean="0"/>
+                        <a:t>Contetns</a:t>
+                      </a:r>
+                      <a:endParaRPr lang="en-US" dirty="0"/>
+                    </a:p>
+                  </a:txBody>
+                  <a:tcPr>
+                    <a:lnL w="19050" cap="flat" cmpd="sng" algn="ctr">
+                      <a:solidFill>
+                        <a:srgbClr val="FFFFFF"/>
+                      </a:solidFill>
+                      <a:prstDash val="solid"/>
+                      <a:round/>
+                      <a:headEnd type="none" w="med" len="med"/>
+                      <a:tailEnd type="none" w="med" len="med"/>
+                    </a:lnL>
+                    <a:lnR w="19050" cap="flat" cmpd="sng" algn="ctr">
+                      <a:solidFill>
+                        <a:srgbClr val="FFFFFF"/>
+                      </a:solidFill>
+                      <a:prstDash val="solid"/>
+                      <a:round/>
+                      <a:headEnd type="none" w="med" len="med"/>
+                      <a:tailEnd type="none" w="med" len="med"/>
+                    </a:lnR>
+                    <a:lnT w="19050" cap="flat" cmpd="sng" algn="ctr">
+                      <a:solidFill>
+                        <a:srgbClr val="FFFFFF"/>
+                      </a:solidFill>
+                      <a:prstDash val="solid"/>
+                      <a:round/>
+                      <a:headEnd type="none" w="med" len="med"/>
+                      <a:tailEnd type="none" w="med" len="med"/>
+                    </a:lnT>
+                    <a:lnB w="19050" cap="flat" cmpd="sng" algn="ctr">
+                      <a:solidFill>
+                        <a:srgbClr val="FFFFFF"/>
+                      </a:solidFill>
+                      <a:prstDash val="solid"/>
+                      <a:round/>
+                      <a:headEnd type="none" w="med" len="med"/>
+                      <a:tailEnd type="none" w="med" len="med"/>
+                    </a:lnB>
+                    <a:solidFill>
+                      <a:srgbClr val="595959"/>
+                    </a:solidFill>
+                  </a:tcPr>
+                </a:tc>
+                <a:tc>
+                  <a:txBody>
+                    <a:bodyPr/>
+                    <a:lstStyle/>
+                    <a:p>
+                      <a:r>
+                        <a:rPr lang="en-US" dirty="0" smtClean="0"/>
+                        <a:t>Any Groovy code</a:t>
+                      </a:r>
+                      <a:endParaRPr lang="en-US" dirty="0" smtClean="0"/>
+                    </a:p>
+                  </a:txBody>
+                  <a:tcPr>
+                    <a:lnL w="19050" cap="flat" cmpd="sng" algn="ctr">
+                      <a:solidFill>
+                        <a:srgbClr val="FFFFFF"/>
+                      </a:solidFill>
+                      <a:prstDash val="solid"/>
+                      <a:round/>
+                      <a:headEnd type="none" w="med" len="med"/>
+                      <a:tailEnd type="none" w="med" len="med"/>
+                    </a:lnL>
+                    <a:lnR w="19050" cap="flat" cmpd="sng" algn="ctr">
+                      <a:solidFill>
+                        <a:srgbClr val="FFFFFF"/>
+                      </a:solidFill>
+                      <a:prstDash val="solid"/>
+                      <a:round/>
+                      <a:headEnd type="none" w="med" len="med"/>
+                      <a:tailEnd type="none" w="med" len="med"/>
+                    </a:lnR>
+                    <a:lnT w="19050" cap="flat" cmpd="sng" algn="ctr">
+                      <a:solidFill>
+                        <a:srgbClr val="FFFFFF"/>
+                      </a:solidFill>
+                      <a:prstDash val="solid"/>
+                      <a:round/>
+                      <a:headEnd type="none" w="med" len="med"/>
+                      <a:tailEnd type="none" w="med" len="med"/>
+                    </a:lnT>
+                    <a:lnB w="19050" cap="flat" cmpd="sng" algn="ctr">
+                      <a:solidFill>
+                        <a:srgbClr val="FFFFFF"/>
+                      </a:solidFill>
+                      <a:prstDash val="solid"/>
+                      <a:round/>
+                      <a:headEnd type="none" w="med" len="med"/>
+                      <a:tailEnd type="none" w="med" len="med"/>
+                    </a:lnB>
+                  </a:tcPr>
+                </a:tc>
+                <a:tc>
+                  <a:txBody>
+                    <a:bodyPr/>
+                    <a:lstStyle/>
+                    <a:p>
+                      <a:r>
+                        <a:rPr lang="en-US" dirty="0" smtClean="0"/>
+                        <a:t>Any Groovy code</a:t>
+                      </a:r>
+                      <a:endParaRPr lang="en-US" dirty="0" smtClean="0"/>
+                    </a:p>
+                  </a:txBody>
+                  <a:tcPr>
+                    <a:lnL w="19050" cap="flat" cmpd="sng" algn="ctr">
+                      <a:solidFill>
+                        <a:srgbClr val="FFFFFF"/>
+                      </a:solidFill>
+                      <a:prstDash val="solid"/>
+                      <a:round/>
+                      <a:headEnd type="none" w="med" len="med"/>
+                      <a:tailEnd type="none" w="med" len="med"/>
+                    </a:lnL>
+                    <a:lnR w="19050" cap="flat" cmpd="sng" algn="ctr">
+                      <a:solidFill>
+                        <a:srgbClr val="FFFFFF"/>
+                      </a:solidFill>
+                      <a:prstDash val="solid"/>
+                      <a:round/>
+                      <a:headEnd type="none" w="med" len="med"/>
+                      <a:tailEnd type="none" w="med" len="med"/>
+                    </a:lnR>
+                    <a:lnT w="19050" cap="flat" cmpd="sng" algn="ctr">
+                      <a:solidFill>
+                        <a:srgbClr val="FFFFFF"/>
+                      </a:solidFill>
+                      <a:prstDash val="solid"/>
+                      <a:round/>
+                      <a:headEnd type="none" w="med" len="med"/>
+                      <a:tailEnd type="none" w="med" len="med"/>
+                    </a:lnT>
+                    <a:lnB w="19050" cap="flat" cmpd="sng" algn="ctr">
+                      <a:solidFill>
+                        <a:srgbClr val="FFFFFF"/>
+                      </a:solidFill>
+                      <a:prstDash val="solid"/>
+                      <a:round/>
+                      <a:headEnd type="none" w="med" len="med"/>
+                      <a:tailEnd type="none" w="med" len="med"/>
+                    </a:lnB>
+                  </a:tcPr>
+                </a:tc>
+              </a:tr>
+              <a:tr h="1054294">
+                <a:tc>
+                  <a:txBody>
+                    <a:bodyPr/>
+                    <a:lstStyle/>
+                    <a:p>
+                      <a:r>
+                        <a:rPr lang="en-US" dirty="0" smtClean="0"/>
+                        <a:t>Static</a:t>
+                      </a:r>
+                    </a:p>
+                    <a:p>
+                      <a:r>
+                        <a:rPr lang="en-US" dirty="0" smtClean="0"/>
+                        <a:t>Invocation</a:t>
+                      </a:r>
+                    </a:p>
+                    <a:p>
+                      <a:r>
+                        <a:rPr lang="en-US" dirty="0" smtClean="0"/>
+                        <a:t>(Annotation)</a:t>
+                      </a:r>
+                      <a:endParaRPr lang="en-US" dirty="0"/>
+                    </a:p>
+                  </a:txBody>
+                  <a:tcPr>
+                    <a:lnL w="19050" cap="flat" cmpd="sng" algn="ctr">
+                      <a:solidFill>
+                        <a:srgbClr val="FFFFFF"/>
+                      </a:solidFill>
+                      <a:prstDash val="solid"/>
+                      <a:round/>
+                      <a:headEnd type="none" w="med" len="med"/>
+                      <a:tailEnd type="none" w="med" len="med"/>
+                    </a:lnL>
+                    <a:lnR w="19050" cap="flat" cmpd="sng" algn="ctr">
+                      <a:solidFill>
+                        <a:srgbClr val="FFFFFF"/>
+                      </a:solidFill>
+                      <a:prstDash val="solid"/>
+                      <a:round/>
+                      <a:headEnd type="none" w="med" len="med"/>
+                      <a:tailEnd type="none" w="med" len="med"/>
+                    </a:lnR>
+                    <a:lnT w="19050" cap="flat" cmpd="sng" algn="ctr">
+                      <a:solidFill>
+                        <a:srgbClr val="FFFFFF"/>
+                      </a:solidFill>
+                      <a:prstDash val="solid"/>
+                      <a:round/>
+                      <a:headEnd type="none" w="med" len="med"/>
+                      <a:tailEnd type="none" w="med" len="med"/>
+                    </a:lnT>
+                    <a:lnB w="19050" cap="flat" cmpd="sng" algn="ctr">
+                      <a:solidFill>
+                        <a:srgbClr val="FFFFFF"/>
+                      </a:solidFill>
+                      <a:prstDash val="solid"/>
+                      <a:round/>
+                      <a:headEnd type="none" w="med" len="med"/>
+                      <a:tailEnd type="none" w="med" len="med"/>
+                    </a:lnB>
+                    <a:solidFill>
+                      <a:srgbClr val="595959"/>
+                    </a:solidFill>
+                  </a:tcPr>
+                </a:tc>
+                <a:tc>
+                  <a:txBody>
+                    <a:bodyPr/>
+                    <a:lstStyle/>
+                    <a:p>
+                      <a:r>
+                        <a:rPr lang="en-US" dirty="0" smtClean="0"/>
+                        <a:t>@Library('my-shared-library') _</a:t>
+                      </a:r>
+                    </a:p>
+                  </a:txBody>
+                  <a:tcPr>
+                    <a:lnL w="19050" cap="flat" cmpd="sng" algn="ctr">
+                      <a:solidFill>
+                        <a:srgbClr val="FFFFFF"/>
+                      </a:solidFill>
+                      <a:prstDash val="solid"/>
+                      <a:round/>
+                      <a:headEnd type="none" w="med" len="med"/>
+                      <a:tailEnd type="none" w="med" len="med"/>
+                    </a:lnL>
+                    <a:lnR w="19050" cap="flat" cmpd="sng" algn="ctr">
+                      <a:solidFill>
+                        <a:srgbClr val="FFFFFF"/>
+                      </a:solidFill>
+                      <a:prstDash val="solid"/>
+                      <a:round/>
+                      <a:headEnd type="none" w="med" len="med"/>
+                      <a:tailEnd type="none" w="med" len="med"/>
+                    </a:lnR>
+                    <a:lnT w="19050" cap="flat" cmpd="sng" algn="ctr">
+                      <a:solidFill>
+                        <a:srgbClr val="FFFFFF"/>
+                      </a:solidFill>
+                      <a:prstDash val="solid"/>
+                      <a:round/>
+                      <a:headEnd type="none" w="med" len="med"/>
+                      <a:tailEnd type="none" w="med" len="med"/>
+                    </a:lnT>
+                    <a:lnB w="19050" cap="flat" cmpd="sng" algn="ctr">
+                      <a:solidFill>
+                        <a:srgbClr val="FFFFFF"/>
+                      </a:solidFill>
+                      <a:prstDash val="solid"/>
+                      <a:round/>
+                      <a:headEnd type="none" w="med" len="med"/>
+                      <a:tailEnd type="none" w="med" len="med"/>
+                    </a:lnB>
+                  </a:tcPr>
+                </a:tc>
+                <a:tc>
+                  <a:txBody>
+                    <a:bodyPr/>
+                    <a:lstStyle/>
+                    <a:p>
+                      <a:r>
+                        <a:rPr lang="en-US" dirty="0" smtClean="0"/>
+                        <a:t>@</a:t>
+                      </a:r>
+                      <a:r>
+                        <a:rPr lang="en-US" dirty="0" smtClean="0"/>
+                        <a:t>Library(‘</a:t>
+                      </a:r>
+                      <a:r>
+                        <a:rPr lang="en-US" dirty="0" err="1" smtClean="0"/>
+                        <a:t>rez</a:t>
+                      </a:r>
+                      <a:r>
+                        <a:rPr lang="en-US" dirty="0" smtClean="0"/>
+                        <a:t>')</a:t>
+                      </a:r>
+                    </a:p>
+                    <a:p>
+                      <a:r>
+                        <a:rPr lang="en-US" dirty="0" smtClean="0"/>
+                        <a:t>import </a:t>
+                      </a:r>
+                      <a:r>
+                        <a:rPr lang="en-US" dirty="0" err="1" smtClean="0"/>
+                        <a:t>com.al.rez.BuildClass</a:t>
+                      </a:r>
+                      <a:endParaRPr lang="en-US" dirty="0" smtClean="0"/>
+                    </a:p>
+                  </a:txBody>
+                  <a:tcPr>
+                    <a:lnL w="19050" cap="flat" cmpd="sng" algn="ctr">
+                      <a:solidFill>
+                        <a:srgbClr val="FFFFFF"/>
+                      </a:solidFill>
+                      <a:prstDash val="solid"/>
+                      <a:round/>
+                      <a:headEnd type="none" w="med" len="med"/>
+                      <a:tailEnd type="none" w="med" len="med"/>
+                    </a:lnL>
+                    <a:lnR w="19050" cap="flat" cmpd="sng" algn="ctr">
+                      <a:solidFill>
+                        <a:srgbClr val="FFFFFF"/>
+                      </a:solidFill>
+                      <a:prstDash val="solid"/>
+                      <a:round/>
+                      <a:headEnd type="none" w="med" len="med"/>
+                      <a:tailEnd type="none" w="med" len="med"/>
+                    </a:lnR>
+                    <a:lnT w="19050" cap="flat" cmpd="sng" algn="ctr">
+                      <a:solidFill>
+                        <a:srgbClr val="FFFFFF"/>
+                      </a:solidFill>
+                      <a:prstDash val="solid"/>
+                      <a:round/>
+                      <a:headEnd type="none" w="med" len="med"/>
+                      <a:tailEnd type="none" w="med" len="med"/>
+                    </a:lnT>
+                    <a:lnB w="19050" cap="flat" cmpd="sng" algn="ctr">
+                      <a:solidFill>
+                        <a:srgbClr val="FFFFFF"/>
+                      </a:solidFill>
+                      <a:prstDash val="solid"/>
+                      <a:round/>
+                      <a:headEnd type="none" w="med" len="med"/>
+                      <a:tailEnd type="none" w="med" len="med"/>
+                    </a:lnB>
+                  </a:tcPr>
+                </a:tc>
+              </a:tr>
+              <a:tr h="896327">
+                <a:tc>
+                  <a:txBody>
+                    <a:bodyPr/>
+                    <a:lstStyle/>
+                    <a:p>
+                      <a:r>
+                        <a:rPr lang="en-US" dirty="0" smtClean="0"/>
+                        <a:t>Dynamic</a:t>
+                      </a:r>
+                      <a:r>
+                        <a:rPr lang="en-US" baseline="0" dirty="0" smtClean="0"/>
+                        <a:t> invocation</a:t>
+                      </a:r>
+                    </a:p>
+                    <a:p>
+                      <a:r>
+                        <a:rPr lang="en-US" baseline="0" dirty="0" smtClean="0"/>
+                        <a:t>(step)</a:t>
+                      </a:r>
+                      <a:endParaRPr lang="en-US" dirty="0"/>
+                    </a:p>
+                  </a:txBody>
+                  <a:tcPr>
+                    <a:lnL w="19050" cap="flat" cmpd="sng" algn="ctr">
+                      <a:solidFill>
+                        <a:srgbClr val="FFFFFF"/>
+                      </a:solidFill>
+                      <a:prstDash val="solid"/>
+                      <a:round/>
+                      <a:headEnd type="none" w="med" len="med"/>
+                      <a:tailEnd type="none" w="med" len="med"/>
+                    </a:lnL>
+                    <a:lnR w="19050" cap="flat" cmpd="sng" algn="ctr">
+                      <a:solidFill>
+                        <a:srgbClr val="FFFFFF"/>
+                      </a:solidFill>
+                      <a:prstDash val="solid"/>
+                      <a:round/>
+                      <a:headEnd type="none" w="med" len="med"/>
+                      <a:tailEnd type="none" w="med" len="med"/>
+                    </a:lnR>
+                    <a:lnT w="19050" cap="flat" cmpd="sng" algn="ctr">
+                      <a:solidFill>
+                        <a:srgbClr val="FFFFFF"/>
+                      </a:solidFill>
+                      <a:prstDash val="solid"/>
+                      <a:round/>
+                      <a:headEnd type="none" w="med" len="med"/>
+                      <a:tailEnd type="none" w="med" len="med"/>
+                    </a:lnT>
+                    <a:lnB w="19050" cap="flat" cmpd="sng" algn="ctr">
+                      <a:solidFill>
+                        <a:srgbClr val="FFFFFF"/>
+                      </a:solidFill>
+                      <a:prstDash val="solid"/>
+                      <a:round/>
+                      <a:headEnd type="none" w="med" len="med"/>
+                      <a:tailEnd type="none" w="med" len="med"/>
+                    </a:lnB>
+                    <a:solidFill>
+                      <a:srgbClr val="595959"/>
+                    </a:solidFill>
+                  </a:tcPr>
+                </a:tc>
+                <a:tc>
+                  <a:txBody>
+                    <a:bodyPr/>
+                    <a:lstStyle/>
+                    <a:p>
+                      <a:r>
+                        <a:rPr lang="en-US" dirty="0" smtClean="0"/>
+                        <a:t>library 'my-shared-library'</a:t>
+                      </a:r>
+                    </a:p>
+                  </a:txBody>
+                  <a:tcPr>
+                    <a:lnL w="19050" cap="flat" cmpd="sng" algn="ctr">
+                      <a:solidFill>
+                        <a:srgbClr val="FFFFFF"/>
+                      </a:solidFill>
+                      <a:prstDash val="solid"/>
+                      <a:round/>
+                      <a:headEnd type="none" w="med" len="med"/>
+                      <a:tailEnd type="none" w="med" len="med"/>
+                    </a:lnL>
+                    <a:lnR w="19050" cap="flat" cmpd="sng" algn="ctr">
+                      <a:solidFill>
+                        <a:srgbClr val="FFFFFF"/>
+                      </a:solidFill>
+                      <a:prstDash val="solid"/>
+                      <a:round/>
+                      <a:headEnd type="none" w="med" len="med"/>
+                      <a:tailEnd type="none" w="med" len="med"/>
+                    </a:lnR>
+                    <a:lnT w="19050" cap="flat" cmpd="sng" algn="ctr">
+                      <a:solidFill>
+                        <a:srgbClr val="FFFFFF"/>
+                      </a:solidFill>
+                      <a:prstDash val="solid"/>
+                      <a:round/>
+                      <a:headEnd type="none" w="med" len="med"/>
+                      <a:tailEnd type="none" w="med" len="med"/>
+                    </a:lnT>
+                    <a:lnB w="19050" cap="flat" cmpd="sng" algn="ctr">
+                      <a:solidFill>
+                        <a:srgbClr val="FFFFFF"/>
+                      </a:solidFill>
+                      <a:prstDash val="solid"/>
+                      <a:round/>
+                      <a:headEnd type="none" w="med" len="med"/>
+                      <a:tailEnd type="none" w="med" len="med"/>
+                    </a:lnB>
+                  </a:tcPr>
+                </a:tc>
+                <a:tc>
+                  <a:txBody>
+                    <a:bodyPr/>
+                    <a:lstStyle/>
+                    <a:p>
+                      <a:r>
+                        <a:rPr lang="en-US" dirty="0" smtClean="0"/>
+                        <a:t>library(’</a:t>
+                      </a:r>
+                      <a:r>
+                        <a:rPr lang="en-US" dirty="0" err="1" smtClean="0"/>
+                        <a:t>rez</a:t>
+                      </a:r>
+                      <a:r>
+                        <a:rPr lang="en-US" dirty="0" smtClean="0"/>
+                        <a:t>’).</a:t>
+                      </a:r>
+                      <a:r>
+                        <a:rPr lang="en-US" dirty="0" err="1" smtClean="0"/>
+                        <a:t>com.al.rez.BuildClass.builds</a:t>
+                      </a:r>
+                      <a:r>
+                        <a:rPr lang="en-US" dirty="0" smtClean="0"/>
+                        <a:t>(</a:t>
+                      </a:r>
+                      <a:r>
+                        <a:rPr lang="en-US" dirty="0" smtClean="0"/>
+                        <a:t>)</a:t>
+                      </a:r>
+                      <a:endParaRPr lang="en-US" dirty="0"/>
+                    </a:p>
+                  </a:txBody>
+                  <a:tcPr>
+                    <a:lnL w="19050" cap="flat" cmpd="sng" algn="ctr">
+                      <a:solidFill>
+                        <a:srgbClr val="FFFFFF"/>
+                      </a:solidFill>
+                      <a:prstDash val="solid"/>
+                      <a:round/>
+                      <a:headEnd type="none" w="med" len="med"/>
+                      <a:tailEnd type="none" w="med" len="med"/>
+                    </a:lnL>
+                    <a:lnR w="19050" cap="flat" cmpd="sng" algn="ctr">
+                      <a:solidFill>
+                        <a:srgbClr val="FFFFFF"/>
+                      </a:solidFill>
+                      <a:prstDash val="solid"/>
+                      <a:round/>
+                      <a:headEnd type="none" w="med" len="med"/>
+                      <a:tailEnd type="none" w="med" len="med"/>
+                    </a:lnR>
+                    <a:lnT w="19050" cap="flat" cmpd="sng" algn="ctr">
+                      <a:solidFill>
+                        <a:srgbClr val="FFFFFF"/>
+                      </a:solidFill>
+                      <a:prstDash val="solid"/>
+                      <a:round/>
+                      <a:headEnd type="none" w="med" len="med"/>
+                      <a:tailEnd type="none" w="med" len="med"/>
+                    </a:lnT>
+                    <a:lnB w="19050" cap="flat" cmpd="sng" algn="ctr">
+                      <a:solidFill>
+                        <a:srgbClr val="FFFFFF"/>
+                      </a:solidFill>
+                      <a:prstDash val="solid"/>
+                      <a:round/>
+                      <a:headEnd type="none" w="med" len="med"/>
+                      <a:tailEnd type="none" w="med" len="med"/>
+                    </a:lnB>
+                  </a:tcPr>
+                </a:tc>
+              </a:tr>
+              <a:tr h="519300">
+                <a:tc>
+                  <a:txBody>
+                    <a:bodyPr/>
+                    <a:lstStyle/>
+                    <a:p>
+                      <a:r>
+                        <a:rPr lang="en-US" dirty="0" smtClean="0"/>
+                        <a:t>Resolution</a:t>
+                      </a:r>
+                      <a:endParaRPr lang="en-US" dirty="0"/>
+                    </a:p>
+                  </a:txBody>
+                  <a:tcPr>
+                    <a:lnL w="19050" cap="flat" cmpd="sng" algn="ctr">
+                      <a:solidFill>
+                        <a:srgbClr val="FFFFFF"/>
+                      </a:solidFill>
+                      <a:prstDash val="solid"/>
+                      <a:round/>
+                      <a:headEnd type="none" w="med" len="med"/>
+                      <a:tailEnd type="none" w="med" len="med"/>
+                    </a:lnL>
+                    <a:lnR w="19050" cap="flat" cmpd="sng" algn="ctr">
+                      <a:solidFill>
+                        <a:srgbClr val="FFFFFF"/>
+                      </a:solidFill>
+                      <a:prstDash val="solid"/>
+                      <a:round/>
+                      <a:headEnd type="none" w="med" len="med"/>
+                      <a:tailEnd type="none" w="med" len="med"/>
+                    </a:lnR>
+                    <a:lnT w="19050" cap="flat" cmpd="sng" algn="ctr">
+                      <a:solidFill>
+                        <a:srgbClr val="FFFFFF"/>
+                      </a:solidFill>
+                      <a:prstDash val="solid"/>
+                      <a:round/>
+                      <a:headEnd type="none" w="med" len="med"/>
+                      <a:tailEnd type="none" w="med" len="med"/>
+                    </a:lnT>
+                    <a:lnB w="19050" cap="flat" cmpd="sng" algn="ctr">
+                      <a:solidFill>
+                        <a:srgbClr val="FFFFFF"/>
+                      </a:solidFill>
+                      <a:prstDash val="solid"/>
+                      <a:round/>
+                      <a:headEnd type="none" w="med" len="med"/>
+                      <a:tailEnd type="none" w="med" len="med"/>
+                    </a:lnB>
+                    <a:solidFill>
+                      <a:srgbClr val="595959"/>
+                    </a:solidFill>
+                  </a:tcPr>
+                </a:tc>
+                <a:tc>
+                  <a:txBody>
+                    <a:bodyPr/>
+                    <a:lstStyle/>
+                    <a:p>
+                      <a:r>
+                        <a:rPr lang="en-US" dirty="0" smtClean="0"/>
+                        <a:t>At run time</a:t>
+                      </a:r>
+                      <a:endParaRPr lang="en-US" dirty="0"/>
+                    </a:p>
+                  </a:txBody>
+                  <a:tcPr>
+                    <a:lnL w="19050" cap="flat" cmpd="sng" algn="ctr">
+                      <a:solidFill>
+                        <a:srgbClr val="FFFFFF"/>
+                      </a:solidFill>
+                      <a:prstDash val="solid"/>
+                      <a:round/>
+                      <a:headEnd type="none" w="med" len="med"/>
+                      <a:tailEnd type="none" w="med" len="med"/>
+                    </a:lnL>
+                    <a:lnR w="19050" cap="flat" cmpd="sng" algn="ctr">
+                      <a:solidFill>
+                        <a:srgbClr val="FFFFFF"/>
+                      </a:solidFill>
+                      <a:prstDash val="solid"/>
+                      <a:round/>
+                      <a:headEnd type="none" w="med" len="med"/>
+                      <a:tailEnd type="none" w="med" len="med"/>
+                    </a:lnR>
+                    <a:lnT w="19050" cap="flat" cmpd="sng" algn="ctr">
+                      <a:solidFill>
+                        <a:srgbClr val="FFFFFF"/>
+                      </a:solidFill>
+                      <a:prstDash val="solid"/>
+                      <a:round/>
+                      <a:headEnd type="none" w="med" len="med"/>
+                      <a:tailEnd type="none" w="med" len="med"/>
+                    </a:lnT>
+                    <a:lnB w="19050" cap="flat" cmpd="sng" algn="ctr">
+                      <a:solidFill>
+                        <a:srgbClr val="FFFFFF"/>
+                      </a:solidFill>
+                      <a:prstDash val="solid"/>
+                      <a:round/>
+                      <a:headEnd type="none" w="med" len="med"/>
+                      <a:tailEnd type="none" w="med" len="med"/>
+                    </a:lnB>
+                  </a:tcPr>
+                </a:tc>
+                <a:tc>
+                  <a:txBody>
+                    <a:bodyPr/>
+                    <a:lstStyle/>
+                    <a:p>
+                      <a:r>
+                        <a:rPr lang="en-US" dirty="0" smtClean="0"/>
+                        <a:t>At compile time</a:t>
+                      </a:r>
+                      <a:endParaRPr lang="en-US" dirty="0"/>
+                    </a:p>
+                  </a:txBody>
+                  <a:tcPr>
+                    <a:lnL w="19050" cap="flat" cmpd="sng" algn="ctr">
+                      <a:solidFill>
+                        <a:srgbClr val="FFFFFF"/>
+                      </a:solidFill>
+                      <a:prstDash val="solid"/>
+                      <a:round/>
+                      <a:headEnd type="none" w="med" len="med"/>
+                      <a:tailEnd type="none" w="med" len="med"/>
+                    </a:lnL>
+                    <a:lnR w="19050" cap="flat" cmpd="sng" algn="ctr">
+                      <a:solidFill>
+                        <a:srgbClr val="FFFFFF"/>
+                      </a:solidFill>
+                      <a:prstDash val="solid"/>
+                      <a:round/>
+                      <a:headEnd type="none" w="med" len="med"/>
+                      <a:tailEnd type="none" w="med" len="med"/>
+                    </a:lnR>
+                    <a:lnT w="19050" cap="flat" cmpd="sng" algn="ctr">
+                      <a:solidFill>
+                        <a:srgbClr val="FFFFFF"/>
+                      </a:solidFill>
+                      <a:prstDash val="solid"/>
+                      <a:round/>
+                      <a:headEnd type="none" w="med" len="med"/>
+                      <a:tailEnd type="none" w="med" len="med"/>
+                    </a:lnT>
+                    <a:lnB w="19050" cap="flat" cmpd="sng" algn="ctr">
+                      <a:solidFill>
+                        <a:srgbClr val="FFFFFF"/>
+                      </a:solidFill>
+                      <a:prstDash val="solid"/>
+                      <a:round/>
+                      <a:headEnd type="none" w="med" len="med"/>
+                      <a:tailEnd type="none" w="med" len="med"/>
+                    </a:lnB>
+                  </a:tcPr>
+                </a:tc>
+              </a:tr>
+              <a:tr h="519300">
+                <a:tc>
+                  <a:txBody>
+                    <a:bodyPr/>
+                    <a:lstStyle/>
+                    <a:p>
+                      <a:r>
+                        <a:rPr lang="en-US" dirty="0" smtClean="0"/>
+                        <a:t>Access pipeline </a:t>
+                      </a:r>
+                      <a:r>
+                        <a:rPr lang="en-US" baseline="0" dirty="0" smtClean="0"/>
+                        <a:t>steps directly</a:t>
+                      </a:r>
+                      <a:endParaRPr lang="en-US" dirty="0"/>
+                    </a:p>
+                  </a:txBody>
+                  <a:tcPr>
+                    <a:lnL w="19050" cap="flat" cmpd="sng" algn="ctr">
+                      <a:solidFill>
+                        <a:srgbClr val="FFFFFF"/>
+                      </a:solidFill>
+                      <a:prstDash val="solid"/>
+                      <a:round/>
+                      <a:headEnd type="none" w="med" len="med"/>
+                      <a:tailEnd type="none" w="med" len="med"/>
+                    </a:lnL>
+                    <a:lnR w="19050" cap="flat" cmpd="sng" algn="ctr">
+                      <a:solidFill>
+                        <a:srgbClr val="FFFFFF"/>
+                      </a:solidFill>
+                      <a:prstDash val="solid"/>
+                      <a:round/>
+                      <a:headEnd type="none" w="med" len="med"/>
+                      <a:tailEnd type="none" w="med" len="med"/>
+                    </a:lnR>
+                    <a:lnT w="19050" cap="flat" cmpd="sng" algn="ctr">
+                      <a:solidFill>
+                        <a:srgbClr val="FFFFFF"/>
+                      </a:solidFill>
+                      <a:prstDash val="solid"/>
+                      <a:round/>
+                      <a:headEnd type="none" w="med" len="med"/>
+                      <a:tailEnd type="none" w="med" len="med"/>
+                    </a:lnT>
+                    <a:lnB w="19050" cap="flat" cmpd="sng" algn="ctr">
+                      <a:solidFill>
+                        <a:srgbClr val="FFFFFF"/>
+                      </a:solidFill>
+                      <a:prstDash val="solid"/>
+                      <a:round/>
+                      <a:headEnd type="none" w="med" len="med"/>
+                      <a:tailEnd type="none" w="med" len="med"/>
+                    </a:lnB>
+                    <a:solidFill>
+                      <a:srgbClr val="595959"/>
+                    </a:solidFill>
+                  </a:tcPr>
+                </a:tc>
+                <a:tc>
+                  <a:txBody>
+                    <a:bodyPr/>
+                    <a:lstStyle/>
+                    <a:p>
+                      <a:r>
+                        <a:rPr lang="en-US" dirty="0" smtClean="0"/>
+                        <a:t>YES</a:t>
+                      </a:r>
+                      <a:endParaRPr lang="en-US" dirty="0"/>
+                    </a:p>
+                  </a:txBody>
+                  <a:tcPr>
+                    <a:lnL w="19050" cap="flat" cmpd="sng" algn="ctr">
+                      <a:solidFill>
+                        <a:srgbClr val="FFFFFF"/>
+                      </a:solidFill>
+                      <a:prstDash val="solid"/>
+                      <a:round/>
+                      <a:headEnd type="none" w="med" len="med"/>
+                      <a:tailEnd type="none" w="med" len="med"/>
+                    </a:lnL>
+                    <a:lnR w="19050" cap="flat" cmpd="sng" algn="ctr">
+                      <a:solidFill>
+                        <a:srgbClr val="FFFFFF"/>
+                      </a:solidFill>
+                      <a:prstDash val="solid"/>
+                      <a:round/>
+                      <a:headEnd type="none" w="med" len="med"/>
+                      <a:tailEnd type="none" w="med" len="med"/>
+                    </a:lnR>
+                    <a:lnT w="19050" cap="flat" cmpd="sng" algn="ctr">
+                      <a:solidFill>
+                        <a:srgbClr val="FFFFFF"/>
+                      </a:solidFill>
+                      <a:prstDash val="solid"/>
+                      <a:round/>
+                      <a:headEnd type="none" w="med" len="med"/>
+                      <a:tailEnd type="none" w="med" len="med"/>
+                    </a:lnT>
+                    <a:lnB w="19050" cap="flat" cmpd="sng" algn="ctr">
+                      <a:solidFill>
+                        <a:srgbClr val="FFFFFF"/>
+                      </a:solidFill>
+                      <a:prstDash val="solid"/>
+                      <a:round/>
+                      <a:headEnd type="none" w="med" len="med"/>
+                      <a:tailEnd type="none" w="med" len="med"/>
+                    </a:lnB>
+                  </a:tcPr>
+                </a:tc>
+                <a:tc>
+                  <a:txBody>
+                    <a:bodyPr/>
+                    <a:lstStyle/>
+                    <a:p>
+                      <a:r>
+                        <a:rPr lang="en-US" dirty="0" smtClean="0"/>
+                        <a:t>NO</a:t>
+                      </a:r>
+                      <a:endParaRPr lang="en-US" dirty="0"/>
+                    </a:p>
+                  </a:txBody>
+                  <a:tcPr>
+                    <a:lnL w="19050" cap="flat" cmpd="sng" algn="ctr">
+                      <a:solidFill>
+                        <a:srgbClr val="FFFFFF"/>
+                      </a:solidFill>
+                      <a:prstDash val="solid"/>
+                      <a:round/>
+                      <a:headEnd type="none" w="med" len="med"/>
+                      <a:tailEnd type="none" w="med" len="med"/>
+                    </a:lnL>
+                    <a:lnR w="19050" cap="flat" cmpd="sng" algn="ctr">
+                      <a:solidFill>
+                        <a:srgbClr val="FFFFFF"/>
+                      </a:solidFill>
+                      <a:prstDash val="solid"/>
+                      <a:round/>
+                      <a:headEnd type="none" w="med" len="med"/>
+                      <a:tailEnd type="none" w="med" len="med"/>
+                    </a:lnR>
+                    <a:lnT w="19050" cap="flat" cmpd="sng" algn="ctr">
+                      <a:solidFill>
+                        <a:srgbClr val="FFFFFF"/>
+                      </a:solidFill>
+                      <a:prstDash val="solid"/>
+                      <a:round/>
+                      <a:headEnd type="none" w="med" len="med"/>
+                      <a:tailEnd type="none" w="med" len="med"/>
+                    </a:lnT>
+                    <a:lnB w="19050" cap="flat" cmpd="sng" algn="ctr">
+                      <a:solidFill>
+                        <a:srgbClr val="FFFFFF"/>
+                      </a:solidFill>
+                      <a:prstDash val="solid"/>
+                      <a:round/>
+                      <a:headEnd type="none" w="med" len="med"/>
+                      <a:tailEnd type="none" w="med" len="med"/>
+                    </a:lnB>
+                  </a:tcPr>
+                </a:tc>
+              </a:tr>
+              <a:tr h="519300">
+                <a:tc>
+                  <a:txBody>
+                    <a:bodyPr/>
+                    <a:lstStyle/>
+                    <a:p>
+                      <a:r>
+                        <a:rPr lang="en-US" dirty="0" smtClean="0"/>
+                        <a:t>Access </a:t>
+                      </a:r>
+                      <a:r>
+                        <a:rPr lang="en-US" dirty="0" err="1" smtClean="0"/>
+                        <a:t>env</a:t>
+                      </a:r>
+                      <a:r>
+                        <a:rPr lang="en-US" dirty="0" smtClean="0"/>
+                        <a:t> </a:t>
+                      </a:r>
+                      <a:r>
+                        <a:rPr lang="en-US" baseline="0" dirty="0" err="1" smtClean="0"/>
+                        <a:t>vars</a:t>
+                      </a:r>
+                      <a:r>
+                        <a:rPr lang="en-US" baseline="0" dirty="0" smtClean="0"/>
+                        <a:t> directly</a:t>
+                      </a:r>
+                      <a:endParaRPr lang="en-US" dirty="0"/>
+                    </a:p>
+                  </a:txBody>
+                  <a:tcPr>
+                    <a:lnL w="19050" cap="flat" cmpd="sng" algn="ctr">
+                      <a:solidFill>
+                        <a:srgbClr val="FFFFFF"/>
+                      </a:solidFill>
+                      <a:prstDash val="solid"/>
+                      <a:round/>
+                      <a:headEnd type="none" w="med" len="med"/>
+                      <a:tailEnd type="none" w="med" len="med"/>
+                    </a:lnL>
+                    <a:lnR w="19050" cap="flat" cmpd="sng" algn="ctr">
+                      <a:solidFill>
+                        <a:srgbClr val="FFFFFF"/>
+                      </a:solidFill>
+                      <a:prstDash val="solid"/>
+                      <a:round/>
+                      <a:headEnd type="none" w="med" len="med"/>
+                      <a:tailEnd type="none" w="med" len="med"/>
+                    </a:lnR>
+                    <a:lnT w="19050" cap="flat" cmpd="sng" algn="ctr">
+                      <a:solidFill>
+                        <a:srgbClr val="FFFFFF"/>
+                      </a:solidFill>
+                      <a:prstDash val="solid"/>
+                      <a:round/>
+                      <a:headEnd type="none" w="med" len="med"/>
+                      <a:tailEnd type="none" w="med" len="med"/>
+                    </a:lnT>
+                    <a:lnB w="19050" cap="flat" cmpd="sng" algn="ctr">
+                      <a:solidFill>
+                        <a:srgbClr val="FFFFFF"/>
+                      </a:solidFill>
+                      <a:prstDash val="solid"/>
+                      <a:round/>
+                      <a:headEnd type="none" w="med" len="med"/>
+                      <a:tailEnd type="none" w="med" len="med"/>
+                    </a:lnB>
+                    <a:solidFill>
+                      <a:srgbClr val="595959"/>
+                    </a:solidFill>
+                  </a:tcPr>
+                </a:tc>
+                <a:tc>
+                  <a:txBody>
+                    <a:bodyPr/>
+                    <a:lstStyle/>
+                    <a:p>
+                      <a:r>
+                        <a:rPr lang="en-US" dirty="0" smtClean="0"/>
+                        <a:t>YES</a:t>
+                      </a:r>
+                      <a:endParaRPr lang="en-US" dirty="0"/>
+                    </a:p>
+                  </a:txBody>
+                  <a:tcPr>
+                    <a:lnL w="19050" cap="flat" cmpd="sng" algn="ctr">
+                      <a:solidFill>
+                        <a:srgbClr val="FFFFFF"/>
+                      </a:solidFill>
+                      <a:prstDash val="solid"/>
+                      <a:round/>
+                      <a:headEnd type="none" w="med" len="med"/>
+                      <a:tailEnd type="none" w="med" len="med"/>
+                    </a:lnL>
+                    <a:lnR w="19050" cap="flat" cmpd="sng" algn="ctr">
+                      <a:solidFill>
+                        <a:srgbClr val="FFFFFF"/>
+                      </a:solidFill>
+                      <a:prstDash val="solid"/>
+                      <a:round/>
+                      <a:headEnd type="none" w="med" len="med"/>
+                      <a:tailEnd type="none" w="med" len="med"/>
+                    </a:lnR>
+                    <a:lnT w="19050" cap="flat" cmpd="sng" algn="ctr">
+                      <a:solidFill>
+                        <a:srgbClr val="FFFFFF"/>
+                      </a:solidFill>
+                      <a:prstDash val="solid"/>
+                      <a:round/>
+                      <a:headEnd type="none" w="med" len="med"/>
+                      <a:tailEnd type="none" w="med" len="med"/>
+                    </a:lnT>
+                    <a:lnB w="19050" cap="flat" cmpd="sng" algn="ctr">
+                      <a:solidFill>
+                        <a:srgbClr val="FFFFFF"/>
+                      </a:solidFill>
+                      <a:prstDash val="solid"/>
+                      <a:round/>
+                      <a:headEnd type="none" w="med" len="med"/>
+                      <a:tailEnd type="none" w="med" len="med"/>
+                    </a:lnB>
+                  </a:tcPr>
+                </a:tc>
+                <a:tc>
+                  <a:txBody>
+                    <a:bodyPr/>
+                    <a:lstStyle/>
+                    <a:p>
+                      <a:r>
+                        <a:rPr lang="en-US" dirty="0" smtClean="0"/>
+                        <a:t>NO</a:t>
+                      </a:r>
+                      <a:endParaRPr lang="en-US" dirty="0"/>
+                    </a:p>
+                  </a:txBody>
+                  <a:tcPr>
+                    <a:lnL w="19050" cap="flat" cmpd="sng" algn="ctr">
+                      <a:solidFill>
+                        <a:srgbClr val="FFFFFF"/>
+                      </a:solidFill>
+                      <a:prstDash val="solid"/>
+                      <a:round/>
+                      <a:headEnd type="none" w="med" len="med"/>
+                      <a:tailEnd type="none" w="med" len="med"/>
+                    </a:lnL>
+                    <a:lnR w="19050" cap="flat" cmpd="sng" algn="ctr">
+                      <a:solidFill>
+                        <a:srgbClr val="FFFFFF"/>
+                      </a:solidFill>
+                      <a:prstDash val="solid"/>
+                      <a:round/>
+                      <a:headEnd type="none" w="med" len="med"/>
+                      <a:tailEnd type="none" w="med" len="med"/>
+                    </a:lnR>
+                    <a:lnT w="19050" cap="flat" cmpd="sng" algn="ctr">
+                      <a:solidFill>
+                        <a:srgbClr val="FFFFFF"/>
+                      </a:solidFill>
+                      <a:prstDash val="solid"/>
+                      <a:round/>
+                      <a:headEnd type="none" w="med" len="med"/>
+                      <a:tailEnd type="none" w="med" len="med"/>
+                    </a:lnT>
+                    <a:lnB w="19050" cap="flat" cmpd="sng" algn="ctr">
+                      <a:solidFill>
+                        <a:srgbClr val="FFFFFF"/>
+                      </a:solidFill>
+                      <a:prstDash val="solid"/>
+                      <a:round/>
+                      <a:headEnd type="none" w="med" len="med"/>
+                      <a:tailEnd type="none" w="med" len="med"/>
+                    </a:lnB>
+                  </a:tcPr>
+                </a:tc>
+              </a:tr>
+            </a:tbl>
+          </a:graphicData>
+        </a:graphic>
+      </p:graphicFrame>
     </p:spTree>
     <p:extLst>
       <p:ext uri="{BB962C8B-B14F-4D97-AF65-F5344CB8AC3E}">
-        <p14:creationId xmlns:p14="http://schemas.microsoft.com/office/powerpoint/2010/main" val="3098079631"/>
+        <p14:creationId xmlns:p14="http://schemas.microsoft.com/office/powerpoint/2010/main" val="3739707186"/>
+      </p:ext>
+    </p:extLst>
+  </p:cSld>
+  <p:clrMapOvr>
+    <a:masterClrMapping/>
+  </p:clrMapOvr>
+</p:sld>
+</file>
+
+<file path=ppt/slides/slide8.xml><?xml version="1.0" encoding="utf-8"?>
+<p:sld xmlns:a="http://schemas.openxmlformats.org/drawingml/2006/main" xmlns:r="http://schemas.openxmlformats.org/officeDocument/2006/relationships" xmlns:p="http://schemas.openxmlformats.org/presentationml/2006/main">
+  <p:cSld>
+    <p:spTree>
+      <p:nvGrpSpPr>
+        <p:cNvPr id="1" name=""/>
+        <p:cNvGrpSpPr/>
+        <p:nvPr/>
+      </p:nvGrpSpPr>
+      <p:grpSpPr>
+        <a:xfrm>
+          <a:off x="0" y="0"/>
+          <a:ext cx="0" cy="0"/>
+          <a:chOff x="0" y="0"/>
+          <a:chExt cx="0" cy="0"/>
+        </a:xfrm>
+      </p:grpSpPr>
+      <p:sp>
+        <p:nvSpPr>
+          <p:cNvPr id="2" name="Title 1"/>
+          <p:cNvSpPr>
+            <a:spLocks noGrp="1"/>
+          </p:cNvSpPr>
+          <p:nvPr>
+            <p:ph type="title"/>
+          </p:nvPr>
+        </p:nvSpPr>
+        <p:spPr/>
+        <p:txBody>
+          <a:bodyPr/>
+          <a:lstStyle/>
+          <a:p>
+            <a:r>
+              <a:rPr lang="en-US" dirty="0" smtClean="0"/>
+              <a:t>Usage</a:t>
+            </a:r>
+            <a:endParaRPr lang="en-US" dirty="0"/>
+          </a:p>
+        </p:txBody>
+      </p:sp>
+      <p:sp>
+        <p:nvSpPr>
+          <p:cNvPr id="3" name="Content Placeholder 2"/>
+          <p:cNvSpPr>
+            <a:spLocks noGrp="1"/>
+          </p:cNvSpPr>
+          <p:nvPr>
+            <p:ph idx="1"/>
+          </p:nvPr>
+        </p:nvSpPr>
+        <p:spPr/>
+        <p:txBody>
+          <a:bodyPr/>
+          <a:lstStyle/>
+          <a:p>
+            <a:r>
+              <a:rPr lang="en-US" dirty="0"/>
+              <a:t>@Library('my-shared-library') _</a:t>
+            </a:r>
+          </a:p>
+          <a:p>
+            <a:r>
+              <a:rPr lang="en-US" dirty="0"/>
+              <a:t>/* Using a version </a:t>
+            </a:r>
+            <a:r>
+              <a:rPr lang="en-US" dirty="0" err="1"/>
+              <a:t>specifier</a:t>
+            </a:r>
+            <a:r>
+              <a:rPr lang="en-US" dirty="0"/>
+              <a:t>, such as branch, tag, </a:t>
+            </a:r>
+            <a:r>
+              <a:rPr lang="en-US" dirty="0" err="1"/>
+              <a:t>etc</a:t>
+            </a:r>
+            <a:r>
+              <a:rPr lang="en-US" dirty="0"/>
+              <a:t> */</a:t>
+            </a:r>
+          </a:p>
+          <a:p>
+            <a:r>
+              <a:rPr lang="en-US" dirty="0"/>
+              <a:t>@Library('my-shared-library@1.0') _</a:t>
+            </a:r>
+          </a:p>
+          <a:p>
+            <a:r>
+              <a:rPr lang="en-US" dirty="0"/>
+              <a:t>/* Accessing multiple libraries with one statement */</a:t>
+            </a:r>
+          </a:p>
+          <a:p>
+            <a:r>
+              <a:rPr lang="en-US" dirty="0"/>
+              <a:t>@Library(['my-shared-library', 'otherlib@abc1234']) _</a:t>
+            </a:r>
+          </a:p>
+        </p:txBody>
+      </p:sp>
+    </p:spTree>
+    <p:extLst>
+      <p:ext uri="{BB962C8B-B14F-4D97-AF65-F5344CB8AC3E}">
+        <p14:creationId xmlns:p14="http://schemas.microsoft.com/office/powerpoint/2010/main" val="2105811148"/>
+      </p:ext>
+    </p:extLst>
+  </p:cSld>
+  <p:clrMapOvr>
+    <a:masterClrMapping/>
+  </p:clrMapOvr>
+</p:sld>
+</file>
+
+<file path=ppt/slides/slide9.xml><?xml version="1.0" encoding="utf-8"?>
+<p:sld xmlns:a="http://schemas.openxmlformats.org/drawingml/2006/main" xmlns:r="http://schemas.openxmlformats.org/officeDocument/2006/relationships" xmlns:p="http://schemas.openxmlformats.org/presentationml/2006/main">
+  <p:cSld>
+    <p:spTree>
+      <p:nvGrpSpPr>
+        <p:cNvPr id="1" name=""/>
+        <p:cNvGrpSpPr/>
+        <p:nvPr/>
+      </p:nvGrpSpPr>
+      <p:grpSpPr>
+        <a:xfrm>
+          <a:off x="0" y="0"/>
+          <a:ext cx="0" cy="0"/>
+          <a:chOff x="0" y="0"/>
+          <a:chExt cx="0" cy="0"/>
+        </a:xfrm>
+      </p:grpSpPr>
+      <p:sp>
+        <p:nvSpPr>
+          <p:cNvPr id="2" name="Title 1"/>
+          <p:cNvSpPr>
+            <a:spLocks noGrp="1"/>
+          </p:cNvSpPr>
+          <p:nvPr>
+            <p:ph type="title"/>
+          </p:nvPr>
+        </p:nvSpPr>
+        <p:spPr/>
+        <p:txBody>
+          <a:bodyPr/>
+          <a:lstStyle/>
+          <a:p>
+            <a:r>
+              <a:rPr lang="en-US" dirty="0" smtClean="0"/>
+              <a:t>Usage Examples</a:t>
+            </a:r>
+            <a:endParaRPr lang="en-US" dirty="0"/>
+          </a:p>
+        </p:txBody>
+      </p:sp>
+      <p:sp>
+        <p:nvSpPr>
+          <p:cNvPr id="3" name="Content Placeholder 2"/>
+          <p:cNvSpPr>
+            <a:spLocks noGrp="1"/>
+          </p:cNvSpPr>
+          <p:nvPr>
+            <p:ph idx="1"/>
+          </p:nvPr>
+        </p:nvSpPr>
+        <p:spPr/>
+        <p:txBody>
+          <a:bodyPr/>
+          <a:lstStyle/>
+          <a:p>
+            <a:endParaRPr lang="en-US"/>
+          </a:p>
+        </p:txBody>
+      </p:sp>
+    </p:spTree>
+    <p:extLst>
+      <p:ext uri="{BB962C8B-B14F-4D97-AF65-F5344CB8AC3E}">
+        <p14:creationId xmlns:p14="http://schemas.microsoft.com/office/powerpoint/2010/main" val="3678501091"/>
       </p:ext>
     </p:extLst>
   </p:cSld>

</xml_diff>